<commit_message>
Tidied up some grammar in the Javascript, added some pages to the presentation, added conditionals to final page.
</commit_message>
<xml_diff>
--- a/html/presentations/CoderDojoBrayHTML_session5.pptx
+++ b/html/presentations/CoderDojoBrayHTML_session5.pptx
@@ -5,7 +5,7 @@
     <p:sldMasterId id="2147483672" r:id="rId1"/>
   </p:sldMasterIdLst>
   <p:notesMasterIdLst>
-    <p:notesMasterId r:id="rId10"/>
+    <p:notesMasterId r:id="rId12"/>
   </p:notesMasterIdLst>
   <p:sldIdLst>
     <p:sldId id="256" r:id="rId2"/>
@@ -13,9 +13,11 @@
     <p:sldId id="257" r:id="rId4"/>
     <p:sldId id="258" r:id="rId5"/>
     <p:sldId id="278" r:id="rId6"/>
-    <p:sldId id="286" r:id="rId7"/>
-    <p:sldId id="289" r:id="rId8"/>
-    <p:sldId id="288" r:id="rId9"/>
+    <p:sldId id="290" r:id="rId7"/>
+    <p:sldId id="291" r:id="rId8"/>
+    <p:sldId id="286" r:id="rId9"/>
+    <p:sldId id="289" r:id="rId10"/>
+    <p:sldId id="288" r:id="rId11"/>
   </p:sldIdLst>
   <p:sldSz cx="9144000" cy="6858000" type="screen4x3"/>
   <p:notesSz cx="6858000" cy="9144000"/>
@@ -199,7 +201,7 @@
           <a:p>
             <a:fld id="{9650A110-E0B9-45FC-A343-D8EC5640BF3F}" type="datetimeFigureOut">
               <a:rPr lang="en-IE" smtClean="0"/>
-              <a:t>20/09/2012</a:t>
+              <a:t>02/10/2012</a:t>
             </a:fld>
             <a:endParaRPr lang="en-IE"/>
           </a:p>
@@ -551,6 +553,90 @@
 </p:notes>
 </file>
 
+<file path=ppt/notesSlides/notesSlide10.xml><?xml version="1.0" encoding="utf-8"?>
+<p:notes xmlns:a="http://schemas.openxmlformats.org/drawingml/2006/main" xmlns:r="http://schemas.openxmlformats.org/officeDocument/2006/relationships" xmlns:p="http://schemas.openxmlformats.org/presentationml/2006/main">
+  <p:cSld>
+    <p:spTree>
+      <p:nvGrpSpPr>
+        <p:cNvPr id="1" name=""/>
+        <p:cNvGrpSpPr/>
+        <p:nvPr/>
+      </p:nvGrpSpPr>
+      <p:grpSpPr>
+        <a:xfrm>
+          <a:off x="0" y="0"/>
+          <a:ext cx="0" cy="0"/>
+          <a:chOff x="0" y="0"/>
+          <a:chExt cx="0" cy="0"/>
+        </a:xfrm>
+      </p:grpSpPr>
+      <p:sp>
+        <p:nvSpPr>
+          <p:cNvPr id="2" name="Slide Image Placeholder 1"/>
+          <p:cNvSpPr>
+            <a:spLocks noGrp="1" noRot="1" noChangeAspect="1"/>
+          </p:cNvSpPr>
+          <p:nvPr>
+            <p:ph type="sldImg"/>
+          </p:nvPr>
+        </p:nvSpPr>
+        <p:spPr/>
+      </p:sp>
+      <p:sp>
+        <p:nvSpPr>
+          <p:cNvPr id="3" name="Notes Placeholder 2"/>
+          <p:cNvSpPr>
+            <a:spLocks noGrp="1"/>
+          </p:cNvSpPr>
+          <p:nvPr>
+            <p:ph type="body" idx="1"/>
+          </p:nvPr>
+        </p:nvSpPr>
+        <p:spPr/>
+        <p:txBody>
+          <a:bodyPr/>
+          <a:lstStyle/>
+          <a:p>
+            <a:endParaRPr lang="en-IE" dirty="0"/>
+          </a:p>
+        </p:txBody>
+      </p:sp>
+      <p:sp>
+        <p:nvSpPr>
+          <p:cNvPr id="4" name="Slide Number Placeholder 3"/>
+          <p:cNvSpPr>
+            <a:spLocks noGrp="1"/>
+          </p:cNvSpPr>
+          <p:nvPr>
+            <p:ph type="sldNum" sz="quarter" idx="10"/>
+          </p:nvPr>
+        </p:nvSpPr>
+        <p:spPr/>
+        <p:txBody>
+          <a:bodyPr/>
+          <a:lstStyle/>
+          <a:p>
+            <a:fld id="{ABE5CB41-8F34-4FAE-BDD8-10A032863583}" type="slidenum">
+              <a:rPr lang="en-IE" smtClean="0"/>
+              <a:t>10</a:t>
+            </a:fld>
+            <a:endParaRPr lang="en-IE"/>
+          </a:p>
+        </p:txBody>
+      </p:sp>
+    </p:spTree>
+    <p:extLst>
+      <p:ext uri="{BB962C8B-B14F-4D97-AF65-F5344CB8AC3E}">
+        <p14:creationId xmlns:p14="http://schemas.microsoft.com/office/powerpoint/2010/main" val="2067379537"/>
+      </p:ext>
+    </p:extLst>
+  </p:cSld>
+  <p:clrMapOvr>
+    <a:masterClrMapping/>
+  </p:clrMapOvr>
+</p:notes>
+</file>
+
 <file path=ppt/notesSlides/notesSlide2.xml><?xml version="1.0" encoding="utf-8"?>
 <p:notes xmlns:a="http://schemas.openxmlformats.org/drawingml/2006/main" xmlns:r="http://schemas.openxmlformats.org/officeDocument/2006/relationships" xmlns:p="http://schemas.openxmlformats.org/presentationml/2006/main">
   <p:cSld>
@@ -1048,7 +1134,7 @@
           <a:bodyPr/>
           <a:lstStyle/>
           <a:p>
-            <a:endParaRPr lang="en-IE" baseline="0" dirty="0" smtClean="0"/>
+            <a:endParaRPr lang="en-IE" dirty="0"/>
           </a:p>
         </p:txBody>
       </p:sp>
@@ -1078,7 +1164,7 @@
     </p:spTree>
     <p:extLst>
       <p:ext uri="{BB962C8B-B14F-4D97-AF65-F5344CB8AC3E}">
-        <p14:creationId xmlns:p14="http://schemas.microsoft.com/office/powerpoint/2010/main" val="2154761357"/>
+        <p14:creationId xmlns:p14="http://schemas.microsoft.com/office/powerpoint/2010/main" val="2067379537"/>
       </p:ext>
     </p:extLst>
   </p:cSld>
@@ -1163,6 +1249,90 @@
     <p:extLst>
       <p:ext uri="{BB962C8B-B14F-4D97-AF65-F5344CB8AC3E}">
         <p14:creationId xmlns:p14="http://schemas.microsoft.com/office/powerpoint/2010/main" val="2067379537"/>
+      </p:ext>
+    </p:extLst>
+  </p:cSld>
+  <p:clrMapOvr>
+    <a:masterClrMapping/>
+  </p:clrMapOvr>
+</p:notes>
+</file>
+
+<file path=ppt/notesSlides/notesSlide9.xml><?xml version="1.0" encoding="utf-8"?>
+<p:notes xmlns:a="http://schemas.openxmlformats.org/drawingml/2006/main" xmlns:r="http://schemas.openxmlformats.org/officeDocument/2006/relationships" xmlns:p="http://schemas.openxmlformats.org/presentationml/2006/main">
+  <p:cSld>
+    <p:spTree>
+      <p:nvGrpSpPr>
+        <p:cNvPr id="1" name=""/>
+        <p:cNvGrpSpPr/>
+        <p:nvPr/>
+      </p:nvGrpSpPr>
+      <p:grpSpPr>
+        <a:xfrm>
+          <a:off x="0" y="0"/>
+          <a:ext cx="0" cy="0"/>
+          <a:chOff x="0" y="0"/>
+          <a:chExt cx="0" cy="0"/>
+        </a:xfrm>
+      </p:grpSpPr>
+      <p:sp>
+        <p:nvSpPr>
+          <p:cNvPr id="2" name="Slide Image Placeholder 1"/>
+          <p:cNvSpPr>
+            <a:spLocks noGrp="1" noRot="1" noChangeAspect="1"/>
+          </p:cNvSpPr>
+          <p:nvPr>
+            <p:ph type="sldImg"/>
+          </p:nvPr>
+        </p:nvSpPr>
+        <p:spPr/>
+      </p:sp>
+      <p:sp>
+        <p:nvSpPr>
+          <p:cNvPr id="3" name="Notes Placeholder 2"/>
+          <p:cNvSpPr>
+            <a:spLocks noGrp="1"/>
+          </p:cNvSpPr>
+          <p:nvPr>
+            <p:ph type="body" idx="1"/>
+          </p:nvPr>
+        </p:nvSpPr>
+        <p:spPr/>
+        <p:txBody>
+          <a:bodyPr/>
+          <a:lstStyle/>
+          <a:p>
+            <a:endParaRPr lang="en-IE" baseline="0" dirty="0" smtClean="0"/>
+          </a:p>
+        </p:txBody>
+      </p:sp>
+      <p:sp>
+        <p:nvSpPr>
+          <p:cNvPr id="4" name="Slide Number Placeholder 3"/>
+          <p:cNvSpPr>
+            <a:spLocks noGrp="1"/>
+          </p:cNvSpPr>
+          <p:nvPr>
+            <p:ph type="sldNum" sz="quarter" idx="10"/>
+          </p:nvPr>
+        </p:nvSpPr>
+        <p:spPr/>
+        <p:txBody>
+          <a:bodyPr/>
+          <a:lstStyle/>
+          <a:p>
+            <a:fld id="{ABE5CB41-8F34-4FAE-BDD8-10A032863583}" type="slidenum">
+              <a:rPr lang="en-IE" smtClean="0"/>
+              <a:t>9</a:t>
+            </a:fld>
+            <a:endParaRPr lang="en-IE"/>
+          </a:p>
+        </p:txBody>
+      </p:sp>
+    </p:spTree>
+    <p:extLst>
+      <p:ext uri="{BB962C8B-B14F-4D97-AF65-F5344CB8AC3E}">
+        <p14:creationId xmlns:p14="http://schemas.microsoft.com/office/powerpoint/2010/main" val="2154761357"/>
       </p:ext>
     </p:extLst>
   </p:cSld>
@@ -1415,7 +1585,7 @@
           <a:p>
             <a:fld id="{6D57282B-8A94-4CFA-A812-B2453AD9C772}" type="datetimeFigureOut">
               <a:rPr lang="en-IE" smtClean="0"/>
-              <a:t>20/09/2012</a:t>
+              <a:t>02/10/2012</a:t>
             </a:fld>
             <a:endParaRPr lang="en-IE" dirty="0"/>
           </a:p>
@@ -1638,7 +1808,7 @@
           <a:p>
             <a:fld id="{6D57282B-8A94-4CFA-A812-B2453AD9C772}" type="datetimeFigureOut">
               <a:rPr lang="en-IE" smtClean="0"/>
-              <a:t>20/09/2012</a:t>
+              <a:t>02/10/2012</a:t>
             </a:fld>
             <a:endParaRPr lang="en-IE"/>
           </a:p>
@@ -1918,7 +2088,7 @@
           <a:p>
             <a:fld id="{6D57282B-8A94-4CFA-A812-B2453AD9C772}" type="datetimeFigureOut">
               <a:rPr lang="en-IE" smtClean="0"/>
-              <a:t>20/09/2012</a:t>
+              <a:t>02/10/2012</a:t>
             </a:fld>
             <a:endParaRPr lang="en-IE"/>
           </a:p>
@@ -2097,7 +2267,7 @@
           <a:p>
             <a:fld id="{6D57282B-8A94-4CFA-A812-B2453AD9C772}" type="datetimeFigureOut">
               <a:rPr lang="en-IE" smtClean="0"/>
-              <a:t>20/09/2012</a:t>
+              <a:t>02/10/2012</a:t>
             </a:fld>
             <a:endParaRPr lang="en-IE"/>
           </a:p>
@@ -2491,7 +2661,7 @@
           <a:p>
             <a:fld id="{6D57282B-8A94-4CFA-A812-B2453AD9C772}" type="datetimeFigureOut">
               <a:rPr lang="en-IE" smtClean="0"/>
-              <a:t>20/09/2012</a:t>
+              <a:t>02/10/2012</a:t>
             </a:fld>
             <a:endParaRPr lang="en-IE"/>
           </a:p>
@@ -2778,7 +2948,7 @@
           <a:p>
             <a:fld id="{6D57282B-8A94-4CFA-A812-B2453AD9C772}" type="datetimeFigureOut">
               <a:rPr lang="en-IE" smtClean="0"/>
-              <a:t>20/09/2012</a:t>
+              <a:t>02/10/2012</a:t>
             </a:fld>
             <a:endParaRPr lang="en-IE"/>
           </a:p>
@@ -3200,7 +3370,7 @@
           <a:p>
             <a:fld id="{6D57282B-8A94-4CFA-A812-B2453AD9C772}" type="datetimeFigureOut">
               <a:rPr lang="en-IE" smtClean="0"/>
-              <a:t>20/09/2012</a:t>
+              <a:t>02/10/2012</a:t>
             </a:fld>
             <a:endParaRPr lang="en-IE"/>
           </a:p>
@@ -3315,7 +3485,7 @@
           <a:p>
             <a:fld id="{6D57282B-8A94-4CFA-A812-B2453AD9C772}" type="datetimeFigureOut">
               <a:rPr lang="en-IE" smtClean="0"/>
-              <a:t>20/09/2012</a:t>
+              <a:t>02/10/2012</a:t>
             </a:fld>
             <a:endParaRPr lang="en-IE"/>
           </a:p>
@@ -3405,7 +3575,7 @@
           <a:p>
             <a:fld id="{6D57282B-8A94-4CFA-A812-B2453AD9C772}" type="datetimeFigureOut">
               <a:rPr lang="en-IE" smtClean="0"/>
-              <a:t>20/09/2012</a:t>
+              <a:t>02/10/2012</a:t>
             </a:fld>
             <a:endParaRPr lang="en-IE"/>
           </a:p>
@@ -3683,7 +3853,7 @@
           <a:p>
             <a:fld id="{6D57282B-8A94-4CFA-A812-B2453AD9C772}" type="datetimeFigureOut">
               <a:rPr lang="en-IE" smtClean="0"/>
-              <a:t>20/09/2012</a:t>
+              <a:t>02/10/2012</a:t>
             </a:fld>
             <a:endParaRPr lang="en-IE"/>
           </a:p>
@@ -4044,7 +4214,7 @@
           <a:p>
             <a:fld id="{6D57282B-8A94-4CFA-A812-B2453AD9C772}" type="datetimeFigureOut">
               <a:rPr lang="en-IE" smtClean="0"/>
-              <a:t>20/09/2012</a:t>
+              <a:t>02/10/2012</a:t>
             </a:fld>
             <a:endParaRPr lang="en-IE"/>
           </a:p>
@@ -4481,7 +4651,7 @@
           <a:p>
             <a:fld id="{6D57282B-8A94-4CFA-A812-B2453AD9C772}" type="datetimeFigureOut">
               <a:rPr lang="en-IE" smtClean="0"/>
-              <a:t>20/09/2012</a:t>
+              <a:t>02/10/2012</a:t>
             </a:fld>
             <a:endParaRPr lang="en-IE"/>
           </a:p>
@@ -4998,19 +5168,7 @@
           <a:p>
             <a:r>
               <a:rPr lang="en-US" sz="2000" dirty="0" smtClean="0"/>
-              <a:t>Session </a:t>
-            </a:r>
-            <a:r>
-              <a:rPr lang="en-US" sz="2000" dirty="0" smtClean="0"/>
-              <a:t>#5 </a:t>
-            </a:r>
-            <a:r>
-              <a:rPr lang="en-US" sz="2000" dirty="0" smtClean="0"/>
-              <a:t>: </a:t>
-            </a:r>
-            <a:r>
-              <a:rPr lang="en-US" sz="2000" dirty="0" smtClean="0"/>
-              <a:t>My First </a:t>
+              <a:t>Session #5 : My First </a:t>
             </a:r>
             <a:r>
               <a:rPr lang="en-US" sz="2000" dirty="0" err="1" smtClean="0"/>
@@ -5028,6 +5186,140 @@
     <p:extLst>
       <p:ext uri="{BB962C8B-B14F-4D97-AF65-F5344CB8AC3E}">
         <p14:creationId xmlns:p14="http://schemas.microsoft.com/office/powerpoint/2010/main" val="1532374360"/>
+      </p:ext>
+    </p:extLst>
+  </p:cSld>
+  <p:clrMapOvr>
+    <a:masterClrMapping/>
+  </p:clrMapOvr>
+  <p:timing>
+    <p:tnLst>
+      <p:par>
+        <p:cTn id="1" dur="indefinite" restart="never" nodeType="tmRoot"/>
+      </p:par>
+    </p:tnLst>
+  </p:timing>
+</p:sld>
+</file>
+
+<file path=ppt/slides/slide10.xml><?xml version="1.0" encoding="utf-8"?>
+<p:sld xmlns:a="http://schemas.openxmlformats.org/drawingml/2006/main" xmlns:r="http://schemas.openxmlformats.org/officeDocument/2006/relationships" xmlns:p="http://schemas.openxmlformats.org/presentationml/2006/main">
+  <p:cSld>
+    <p:spTree>
+      <p:nvGrpSpPr>
+        <p:cNvPr id="1" name=""/>
+        <p:cNvGrpSpPr/>
+        <p:nvPr/>
+      </p:nvGrpSpPr>
+      <p:grpSpPr>
+        <a:xfrm>
+          <a:off x="0" y="0"/>
+          <a:ext cx="0" cy="0"/>
+          <a:chOff x="0" y="0"/>
+          <a:chExt cx="0" cy="0"/>
+        </a:xfrm>
+      </p:grpSpPr>
+      <p:sp>
+        <p:nvSpPr>
+          <p:cNvPr id="2" name="Title 1"/>
+          <p:cNvSpPr>
+            <a:spLocks noGrp="1"/>
+          </p:cNvSpPr>
+          <p:nvPr>
+            <p:ph type="title"/>
+          </p:nvPr>
+        </p:nvSpPr>
+        <p:spPr>
+          <a:xfrm>
+            <a:off x="1571625" y="155448"/>
+            <a:ext cx="7115175" cy="1252728"/>
+          </a:xfrm>
+        </p:spPr>
+        <p:txBody>
+          <a:bodyPr>
+            <a:normAutofit/>
+          </a:bodyPr>
+          <a:lstStyle/>
+          <a:p>
+            <a:r>
+              <a:rPr lang="en-IE" dirty="0" smtClean="0"/>
+              <a:t>Next Week @ CoderDojo</a:t>
+            </a:r>
+            <a:endParaRPr lang="en-IE" dirty="0"/>
+          </a:p>
+        </p:txBody>
+      </p:sp>
+      <p:sp>
+        <p:nvSpPr>
+          <p:cNvPr id="3" name="Content Placeholder 2"/>
+          <p:cNvSpPr>
+            <a:spLocks noGrp="1"/>
+          </p:cNvSpPr>
+          <p:nvPr>
+            <p:ph idx="1"/>
+          </p:nvPr>
+        </p:nvSpPr>
+        <p:spPr/>
+        <p:txBody>
+          <a:bodyPr>
+            <a:normAutofit lnSpcReduction="10000"/>
+          </a:bodyPr>
+          <a:lstStyle/>
+          <a:p>
+            <a:r>
+              <a:rPr lang="en-IE" dirty="0" smtClean="0"/>
+              <a:t>Next week is the last week of this session</a:t>
+            </a:r>
+          </a:p>
+          <a:p>
+            <a:endParaRPr lang="en-IE" dirty="0"/>
+          </a:p>
+          <a:p>
+            <a:r>
+              <a:rPr lang="en-IE" dirty="0" smtClean="0"/>
+              <a:t>We’re not going to introduce any new HTML/CSS or </a:t>
+            </a:r>
+            <a:r>
+              <a:rPr lang="en-IE" dirty="0" err="1" smtClean="0"/>
+              <a:t>Javascript</a:t>
+            </a:r>
+            <a:r>
+              <a:rPr lang="en-IE" dirty="0" smtClean="0"/>
+              <a:t> next week</a:t>
+            </a:r>
+          </a:p>
+          <a:p>
+            <a:endParaRPr lang="en-IE" dirty="0"/>
+          </a:p>
+          <a:p>
+            <a:r>
+              <a:rPr lang="en-IE" dirty="0" smtClean="0"/>
+              <a:t>We’ll be looking inside some computers and electronics</a:t>
+            </a:r>
+          </a:p>
+          <a:p>
+            <a:endParaRPr lang="en-IE" dirty="0"/>
+          </a:p>
+          <a:p>
+            <a:r>
+              <a:rPr lang="en-IE" dirty="0" smtClean="0"/>
+              <a:t>…and </a:t>
+            </a:r>
+            <a:r>
+              <a:rPr lang="en-IE" dirty="0" smtClean="0"/>
+              <a:t>we can go over anything not clear from any of the earlier sessions … </a:t>
+            </a:r>
+            <a:endParaRPr lang="en-IE" dirty="0" smtClean="0"/>
+          </a:p>
+          <a:p>
+            <a:endParaRPr lang="en-IE" dirty="0" smtClean="0"/>
+          </a:p>
+        </p:txBody>
+      </p:sp>
+    </p:spTree>
+    <p:extLst>
+      <p:ext uri="{BB962C8B-B14F-4D97-AF65-F5344CB8AC3E}">
+        <p14:creationId xmlns:p14="http://schemas.microsoft.com/office/powerpoint/2010/main" val="2711213252"/>
       </p:ext>
     </p:extLst>
   </p:cSld>
@@ -5225,15 +5517,7 @@
           <a:p>
             <a:r>
               <a:rPr lang="en-IE" dirty="0" smtClean="0"/>
-              <a:t>Session </a:t>
-            </a:r>
-            <a:r>
-              <a:rPr lang="en-IE" dirty="0" smtClean="0"/>
-              <a:t>#5</a:t>
-            </a:r>
-            <a:r>
-              <a:rPr lang="en-IE" dirty="0" smtClean="0"/>
-              <a:t/>
+              <a:t>Session #5</a:t>
             </a:r>
             <a:br>
               <a:rPr lang="en-IE" dirty="0" smtClean="0"/>
@@ -5287,7 +5571,6 @@
               <a:rPr lang="en-IE" dirty="0" smtClean="0"/>
               <a:t> program to do simple animation on a web page</a:t>
             </a:r>
-            <a:endParaRPr lang="en-IE" dirty="0" smtClean="0"/>
           </a:p>
           <a:p>
             <a:endParaRPr lang="en-IE" dirty="0"/>
@@ -5299,9 +5582,8 @@
             </a:r>
             <a:r>
               <a:rPr lang="en-IE" dirty="0" smtClean="0"/>
-              <a:t> and Animation is the basis for lots of Browser based games</a:t>
-            </a:r>
-            <a:endParaRPr lang="en-IE" dirty="0" smtClean="0"/>
+              <a:t> and Animation are the basis for lots of Browser based games</a:t>
+            </a:r>
           </a:p>
           <a:p>
             <a:endParaRPr lang="en-IE" dirty="0"/>
@@ -5387,11 +5669,7 @@
           <a:p>
             <a:r>
               <a:rPr lang="en-US" dirty="0" smtClean="0"/>
-              <a:t>We used CSS to </a:t>
-            </a:r>
-            <a:r>
-              <a:rPr lang="en-US" dirty="0" smtClean="0"/>
-              <a:t>layout a page nicely</a:t>
+              <a:t>We used CSS to layout a page nicely</a:t>
             </a:r>
           </a:p>
           <a:p>
@@ -5582,7 +5860,72 @@
             </a:r>
             <a:r>
               <a:rPr lang="en-IE" dirty="0" smtClean="0"/>
-              <a:t> is … </a:t>
+              <a:t> </a:t>
+            </a:r>
+            <a:r>
+              <a:rPr lang="en-IE" dirty="0" smtClean="0"/>
+              <a:t>is a programming language</a:t>
+            </a:r>
+          </a:p>
+          <a:p>
+            <a:pPr lvl="1"/>
+            <a:r>
+              <a:rPr lang="en-IE" dirty="0" smtClean="0"/>
+              <a:t>HTML/CSS are “descriptive”: they describe what your web page looks like</a:t>
+            </a:r>
+          </a:p>
+          <a:p>
+            <a:pPr lvl="1"/>
+            <a:r>
+              <a:rPr lang="en-IE" dirty="0" err="1" smtClean="0"/>
+              <a:t>Javascript</a:t>
+            </a:r>
+            <a:r>
+              <a:rPr lang="en-IE" dirty="0" smtClean="0"/>
+              <a:t> lets you write </a:t>
+            </a:r>
+            <a:r>
+              <a:rPr lang="en-IE" dirty="0" err="1" smtClean="0"/>
+              <a:t>progams</a:t>
+            </a:r>
+            <a:r>
+              <a:rPr lang="en-IE" dirty="0" smtClean="0"/>
+              <a:t> that do things and these will run inside a web browser</a:t>
+            </a:r>
+          </a:p>
+          <a:p>
+            <a:r>
+              <a:rPr lang="en-IE" dirty="0" smtClean="0"/>
+              <a:t> </a:t>
+            </a:r>
+            <a:r>
+              <a:rPr lang="en-IE" dirty="0" err="1" smtClean="0"/>
+              <a:t>Javascript</a:t>
+            </a:r>
+            <a:r>
+              <a:rPr lang="en-IE" dirty="0" smtClean="0"/>
+              <a:t> is:</a:t>
+            </a:r>
+          </a:p>
+          <a:p>
+            <a:pPr lvl="1"/>
+            <a:r>
+              <a:rPr lang="en-IE" dirty="0" smtClean="0"/>
+              <a:t>A “scripting” language, not a “compiled” one</a:t>
+            </a:r>
+          </a:p>
+          <a:p>
+            <a:pPr lvl="1"/>
+            <a:r>
+              <a:rPr lang="en-IE" dirty="0" smtClean="0"/>
+              <a:t>Supported by all web browsers</a:t>
+            </a:r>
+          </a:p>
+          <a:p>
+            <a:pPr lvl="1"/>
+            <a:r>
+              <a:rPr lang="en-IE" dirty="0" smtClean="0"/>
+              <a:t>In the top 5 most used languages worldwide</a:t>
             </a:r>
             <a:endParaRPr lang="en-IE" dirty="0" smtClean="0"/>
           </a:p>
@@ -5649,7 +5992,11 @@
           <a:p>
             <a:r>
               <a:rPr lang="en-IE" dirty="0" smtClean="0"/>
-              <a:t>For the time remaining …</a:t>
+              <a:t>Learning </a:t>
+            </a:r>
+            <a:r>
+              <a:rPr lang="en-IE" dirty="0" smtClean="0"/>
+              <a:t>Programming</a:t>
             </a:r>
             <a:endParaRPr lang="en-IE" dirty="0"/>
           </a:p>
@@ -5668,26 +6015,90 @@
         <p:spPr/>
         <p:txBody>
           <a:bodyPr>
-            <a:normAutofit/>
+            <a:normAutofit fontScale="92500" lnSpcReduction="10000"/>
           </a:bodyPr>
           <a:lstStyle/>
           <a:p>
             <a:r>
               <a:rPr lang="en-IE" dirty="0" smtClean="0"/>
-              <a:t>Try </a:t>
-            </a:r>
+              <a:t>Mastering Programming is </a:t>
+            </a:r>
+            <a:r>
+              <a:rPr lang="en-IE" b="1" dirty="0" smtClean="0"/>
+              <a:t>hard</a:t>
+            </a:r>
+            <a:endParaRPr lang="en-IE" dirty="0" smtClean="0"/>
+          </a:p>
+          <a:p>
             <a:r>
               <a:rPr lang="en-IE" dirty="0" smtClean="0"/>
-              <a:t>to …do stuff … </a:t>
+              <a:t>Anyone who tells you it is not is either:</a:t>
+            </a:r>
+          </a:p>
+          <a:p>
+            <a:pPr lvl="1"/>
+            <a:r>
+              <a:rPr lang="en-IE" dirty="0" smtClean="0"/>
+              <a:t>Not very good at programming</a:t>
+            </a:r>
+          </a:p>
+          <a:p>
+            <a:pPr lvl="1"/>
+            <a:r>
+              <a:rPr lang="en-IE" dirty="0" smtClean="0"/>
+              <a:t>Does not understand what programming is</a:t>
+            </a:r>
+          </a:p>
+          <a:p>
+            <a:r>
+              <a:rPr lang="en-US" dirty="0"/>
+              <a:t>Beginning Programming, though, is </a:t>
+            </a:r>
+            <a:r>
+              <a:rPr lang="en-US" b="1" dirty="0" smtClean="0"/>
+              <a:t>easy</a:t>
             </a:r>
             <a:endParaRPr lang="en-IE" dirty="0" smtClean="0"/>
+          </a:p>
+          <a:p>
+            <a:r>
+              <a:rPr lang="en-US" dirty="0" smtClean="0"/>
+              <a:t>Today we are not going to become experts in </a:t>
+            </a:r>
+            <a:r>
+              <a:rPr lang="en-US" dirty="0" err="1" smtClean="0"/>
+              <a:t>Javascript</a:t>
+            </a:r>
+            <a:endParaRPr lang="en-US" dirty="0" smtClean="0"/>
+          </a:p>
+          <a:p>
+            <a:pPr lvl="1"/>
+            <a:r>
+              <a:rPr lang="en-US" dirty="0" smtClean="0"/>
+              <a:t>But we will have a quick peek at it</a:t>
+            </a:r>
+          </a:p>
+          <a:p>
+            <a:pPr lvl="1"/>
+            <a:r>
+              <a:rPr lang="en-US" dirty="0" smtClean="0"/>
+              <a:t>If you want, we will run a complete block of </a:t>
+            </a:r>
+            <a:r>
+              <a:rPr lang="en-US" dirty="0" err="1" smtClean="0"/>
+              <a:t>Javascript</a:t>
+            </a:r>
+            <a:r>
+              <a:rPr lang="en-US" dirty="0" smtClean="0"/>
+              <a:t> sessions in future</a:t>
+            </a:r>
           </a:p>
         </p:txBody>
       </p:sp>
     </p:spTree>
     <p:extLst>
       <p:ext uri="{BB962C8B-B14F-4D97-AF65-F5344CB8AC3E}">
-        <p14:creationId xmlns:p14="http://schemas.microsoft.com/office/powerpoint/2010/main" val="3049304568"/>
+        <p14:creationId xmlns:p14="http://schemas.microsoft.com/office/powerpoint/2010/main" val="1064029330"/>
       </p:ext>
     </p:extLst>
   </p:cSld>
@@ -5731,90 +6142,21 @@
             <p:ph type="title"/>
           </p:nvPr>
         </p:nvSpPr>
-        <p:spPr/>
-        <p:txBody>
-          <a:bodyPr/>
+        <p:spPr>
+          <a:xfrm>
+            <a:off x="1571625" y="155448"/>
+            <a:ext cx="7115175" cy="1252728"/>
+          </a:xfrm>
+        </p:spPr>
+        <p:txBody>
+          <a:bodyPr>
+            <a:normAutofit fontScale="90000"/>
+          </a:bodyPr>
           <a:lstStyle/>
           <a:p>
             <a:r>
               <a:rPr lang="en-IE" dirty="0" smtClean="0"/>
-              <a:t>Now Practice Some More!</a:t>
-            </a:r>
-            <a:endParaRPr lang="en-IE" dirty="0"/>
-          </a:p>
-        </p:txBody>
-      </p:sp>
-      <p:sp>
-        <p:nvSpPr>
-          <p:cNvPr id="3" name="Content Placeholder 2"/>
-          <p:cNvSpPr>
-            <a:spLocks noGrp="1"/>
-          </p:cNvSpPr>
-          <p:nvPr>
-            <p:ph idx="1"/>
-          </p:nvPr>
-        </p:nvSpPr>
-        <p:spPr/>
-        <p:txBody>
-          <a:bodyPr>
-            <a:normAutofit/>
-          </a:bodyPr>
-          <a:lstStyle/>
-          <a:p>
-            <a:pPr marL="118872" indent="0">
-              <a:buNone/>
-            </a:pPr>
-            <a:r>
-              <a:rPr lang="en-IE" dirty="0" smtClean="0"/>
-              <a:t>At </a:t>
-            </a:r>
-            <a:r>
-              <a:rPr lang="en-IE" dirty="0"/>
-              <a:t>home, practice what you learned this week</a:t>
-            </a:r>
-          </a:p>
-          <a:p>
-            <a:pPr marL="118872" indent="0">
-              <a:buNone/>
-            </a:pPr>
-            <a:endParaRPr lang="en-IE" dirty="0" smtClean="0"/>
-          </a:p>
-          <a:p>
-            <a:pPr marL="118872" indent="0">
-              <a:buNone/>
-            </a:pPr>
-            <a:r>
-              <a:rPr lang="en-IE" dirty="0" smtClean="0"/>
-              <a:t>Upload your work to dojo.hallamor.org</a:t>
-            </a:r>
-          </a:p>
-          <a:p>
-            <a:pPr marL="118872" indent="0">
-              <a:buNone/>
-            </a:pPr>
-            <a:endParaRPr lang="en-IE" dirty="0"/>
-          </a:p>
-          <a:p>
-            <a:pPr marL="118872" indent="0">
-              <a:buNone/>
-            </a:pPr>
-            <a:r>
-              <a:rPr lang="en-IE" dirty="0" smtClean="0"/>
-              <a:t>Look at </a:t>
-            </a:r>
-            <a:r>
-              <a:rPr lang="en-IE" dirty="0" smtClean="0">
-                <a:hlinkClick r:id="rId3"/>
-              </a:rPr>
-              <a:t>www.w3schools.com</a:t>
-            </a:r>
-            <a:r>
-              <a:rPr lang="en-IE" dirty="0" smtClean="0"/>
-              <a:t> </a:t>
-            </a:r>
-            <a:r>
-              <a:rPr lang="en-IE" dirty="0" smtClean="0"/>
-              <a:t>and online for more </a:t>
+              <a:t>What can I do with </a:t>
             </a:r>
             <a:r>
               <a:rPr lang="en-IE" dirty="0" err="1" smtClean="0"/>
@@ -5822,46 +6164,88 @@
             </a:r>
             <a:r>
               <a:rPr lang="en-IE" dirty="0" smtClean="0"/>
-              <a:t> tutorials</a:t>
-            </a:r>
-          </a:p>
-          <a:p>
-            <a:pPr marL="118872" indent="0">
-              <a:buNone/>
-            </a:pPr>
+              <a:t>?</a:t>
+            </a:r>
             <a:endParaRPr lang="en-IE" dirty="0"/>
           </a:p>
-          <a:p>
-            <a:pPr marL="118872" indent="0">
-              <a:buNone/>
-            </a:pPr>
+        </p:txBody>
+      </p:sp>
+      <p:sp>
+        <p:nvSpPr>
+          <p:cNvPr id="3" name="Content Placeholder 2"/>
+          <p:cNvSpPr>
+            <a:spLocks noGrp="1"/>
+          </p:cNvSpPr>
+          <p:nvPr>
+            <p:ph idx="1"/>
+          </p:nvPr>
+        </p:nvSpPr>
+        <p:spPr/>
+        <p:txBody>
+          <a:bodyPr>
+            <a:normAutofit fontScale="92500" lnSpcReduction="10000"/>
+          </a:bodyPr>
+          <a:lstStyle/>
+          <a:p>
             <a:r>
               <a:rPr lang="en-IE" dirty="0" smtClean="0"/>
-              <a:t>Send us the URLs of your websites to look at, to </a:t>
-            </a:r>
-            <a:r>
-              <a:rPr lang="en-IE" dirty="0" smtClean="0">
-                <a:hlinkClick r:id="rId4"/>
-              </a:rPr>
-              <a:t>bray@coderdojo.com</a:t>
+              <a:t>In your web pages, you can use </a:t>
+            </a:r>
+            <a:r>
+              <a:rPr lang="en-IE" dirty="0" err="1" smtClean="0"/>
+              <a:t>Javascript</a:t>
             </a:r>
             <a:r>
               <a:rPr lang="en-IE" dirty="0" smtClean="0"/>
-              <a:t> </a:t>
-            </a:r>
-          </a:p>
-          <a:p>
-            <a:pPr marL="118872" indent="0">
-              <a:buNone/>
-            </a:pPr>
-            <a:endParaRPr lang="en-IE" sz="2800" dirty="0" smtClean="0"/>
+              <a:t> to:</a:t>
+            </a:r>
+          </a:p>
+          <a:p>
+            <a:pPr lvl="1"/>
+            <a:r>
+              <a:rPr lang="en-US" dirty="0" smtClean="0"/>
+              <a:t>React when the user does something (like presses a key or clicks the mouse)</a:t>
+            </a:r>
+          </a:p>
+          <a:p>
+            <a:pPr lvl="1"/>
+            <a:r>
+              <a:rPr lang="en-US" dirty="0" smtClean="0"/>
+              <a:t>Access anything on the web page and change its content, or style, or attributes</a:t>
+            </a:r>
+          </a:p>
+          <a:p>
+            <a:pPr lvl="1"/>
+            <a:r>
+              <a:rPr lang="en-US" dirty="0" smtClean="0"/>
+              <a:t>Create new elements and insert them into the page anywhere you want, with any style</a:t>
+            </a:r>
+          </a:p>
+          <a:p>
+            <a:pPr lvl="1"/>
+            <a:r>
+              <a:rPr lang="en-IE" dirty="0" smtClean="0"/>
+              <a:t>… and lots more complicated stuff like talking to web servers and getting data</a:t>
+            </a:r>
+            <a:endParaRPr lang="en-US" dirty="0" smtClean="0"/>
+          </a:p>
+          <a:p>
+            <a:r>
+              <a:rPr lang="en-US" dirty="0" smtClean="0"/>
+              <a:t>In other words, your web page can change on th</a:t>
+            </a:r>
+            <a:r>
+              <a:rPr lang="en-US" dirty="0" smtClean="0"/>
+              <a:t>e fly</a:t>
+            </a:r>
+            <a:endParaRPr lang="en-IE" dirty="0" smtClean="0"/>
           </a:p>
         </p:txBody>
       </p:sp>
     </p:spTree>
     <p:extLst>
       <p:ext uri="{BB962C8B-B14F-4D97-AF65-F5344CB8AC3E}">
-        <p14:creationId xmlns:p14="http://schemas.microsoft.com/office/powerpoint/2010/main" val="2703784961"/>
+        <p14:creationId xmlns:p14="http://schemas.microsoft.com/office/powerpoint/2010/main" val="2757274783"/>
       </p:ext>
     </p:extLst>
   </p:cSld>
@@ -5919,7 +6303,7 @@
           <a:p>
             <a:r>
               <a:rPr lang="en-IE" dirty="0" smtClean="0"/>
-              <a:t>Next Week @ CoderDojo</a:t>
+              <a:t>For the time remaining …</a:t>
             </a:r>
             <a:endParaRPr lang="en-IE" dirty="0"/>
           </a:p>
@@ -5944,58 +6328,185 @@
           <a:p>
             <a:r>
               <a:rPr lang="en-IE" dirty="0" smtClean="0"/>
-              <a:t>Next week </a:t>
-            </a:r>
-            <a:r>
-              <a:rPr lang="en-IE" dirty="0" smtClean="0"/>
-              <a:t>is the last week of this session</a:t>
-            </a:r>
-          </a:p>
-          <a:p>
-            <a:endParaRPr lang="en-IE" dirty="0"/>
-          </a:p>
-          <a:p>
-            <a:r>
-              <a:rPr lang="en-IE" dirty="0" smtClean="0"/>
-              <a:t>We’re not going to introduce any new HTML/CSS or </a:t>
-            </a:r>
-            <a:r>
-              <a:rPr lang="en-IE" dirty="0" err="1" smtClean="0"/>
-              <a:t>Javascript</a:t>
-            </a:r>
-            <a:r>
-              <a:rPr lang="en-IE" dirty="0" smtClean="0"/>
-              <a:t> next week</a:t>
-            </a:r>
-          </a:p>
-          <a:p>
-            <a:endParaRPr lang="en-IE" dirty="0"/>
-          </a:p>
-          <a:p>
-            <a:r>
-              <a:rPr lang="en-IE" dirty="0" smtClean="0"/>
-              <a:t>We’ll be looking inside some computers and electronics</a:t>
-            </a:r>
-          </a:p>
-          <a:p>
-            <a:endParaRPr lang="en-IE" dirty="0"/>
-          </a:p>
-          <a:p>
-            <a:r>
-              <a:rPr lang="en-IE" dirty="0" smtClean="0"/>
-              <a:t>…and you can work on your web projects … </a:t>
-            </a:r>
-            <a:endParaRPr lang="en-IE" dirty="0" smtClean="0"/>
-          </a:p>
-          <a:p>
-            <a:endParaRPr lang="en-IE" dirty="0" smtClean="0"/>
+              <a:t>Try to …do stuff … </a:t>
+            </a:r>
           </a:p>
         </p:txBody>
       </p:sp>
     </p:spTree>
     <p:extLst>
       <p:ext uri="{BB962C8B-B14F-4D97-AF65-F5344CB8AC3E}">
-        <p14:creationId xmlns:p14="http://schemas.microsoft.com/office/powerpoint/2010/main" val="2711213252"/>
+        <p14:creationId xmlns:p14="http://schemas.microsoft.com/office/powerpoint/2010/main" val="3049304568"/>
+      </p:ext>
+    </p:extLst>
+  </p:cSld>
+  <p:clrMapOvr>
+    <a:masterClrMapping/>
+  </p:clrMapOvr>
+  <p:timing>
+    <p:tnLst>
+      <p:par>
+        <p:cTn id="1" dur="indefinite" restart="never" nodeType="tmRoot"/>
+      </p:par>
+    </p:tnLst>
+  </p:timing>
+</p:sld>
+</file>
+
+<file path=ppt/slides/slide9.xml><?xml version="1.0" encoding="utf-8"?>
+<p:sld xmlns:a="http://schemas.openxmlformats.org/drawingml/2006/main" xmlns:r="http://schemas.openxmlformats.org/officeDocument/2006/relationships" xmlns:p="http://schemas.openxmlformats.org/presentationml/2006/main">
+  <p:cSld>
+    <p:spTree>
+      <p:nvGrpSpPr>
+        <p:cNvPr id="1" name=""/>
+        <p:cNvGrpSpPr/>
+        <p:nvPr/>
+      </p:nvGrpSpPr>
+      <p:grpSpPr>
+        <a:xfrm>
+          <a:off x="0" y="0"/>
+          <a:ext cx="0" cy="0"/>
+          <a:chOff x="0" y="0"/>
+          <a:chExt cx="0" cy="0"/>
+        </a:xfrm>
+      </p:grpSpPr>
+      <p:sp>
+        <p:nvSpPr>
+          <p:cNvPr id="2" name="Title 1"/>
+          <p:cNvSpPr>
+            <a:spLocks noGrp="1"/>
+          </p:cNvSpPr>
+          <p:nvPr>
+            <p:ph type="title"/>
+          </p:nvPr>
+        </p:nvSpPr>
+        <p:spPr/>
+        <p:txBody>
+          <a:bodyPr/>
+          <a:lstStyle/>
+          <a:p>
+            <a:r>
+              <a:rPr lang="en-IE" dirty="0" smtClean="0"/>
+              <a:t>Now Practice Some More!</a:t>
+            </a:r>
+            <a:endParaRPr lang="en-IE" dirty="0"/>
+          </a:p>
+        </p:txBody>
+      </p:sp>
+      <p:sp>
+        <p:nvSpPr>
+          <p:cNvPr id="3" name="Content Placeholder 2"/>
+          <p:cNvSpPr>
+            <a:spLocks noGrp="1"/>
+          </p:cNvSpPr>
+          <p:nvPr>
+            <p:ph idx="1"/>
+          </p:nvPr>
+        </p:nvSpPr>
+        <p:spPr/>
+        <p:txBody>
+          <a:bodyPr>
+            <a:normAutofit/>
+          </a:bodyPr>
+          <a:lstStyle/>
+          <a:p>
+            <a:pPr marL="118872" indent="0">
+              <a:buNone/>
+            </a:pPr>
+            <a:r>
+              <a:rPr lang="en-IE" dirty="0" smtClean="0"/>
+              <a:t>At </a:t>
+            </a:r>
+            <a:r>
+              <a:rPr lang="en-IE" dirty="0"/>
+              <a:t>home, practice what you learned this week</a:t>
+            </a:r>
+          </a:p>
+          <a:p>
+            <a:pPr marL="118872" indent="0">
+              <a:buNone/>
+            </a:pPr>
+            <a:endParaRPr lang="en-IE" dirty="0" smtClean="0"/>
+          </a:p>
+          <a:p>
+            <a:pPr marL="118872" indent="0">
+              <a:buNone/>
+            </a:pPr>
+            <a:r>
+              <a:rPr lang="en-IE" dirty="0" smtClean="0"/>
+              <a:t>Upload your work to dojo.hallamor.org</a:t>
+            </a:r>
+          </a:p>
+          <a:p>
+            <a:pPr marL="118872" indent="0">
+              <a:buNone/>
+            </a:pPr>
+            <a:endParaRPr lang="en-IE" dirty="0"/>
+          </a:p>
+          <a:p>
+            <a:pPr marL="118872" indent="0">
+              <a:buNone/>
+            </a:pPr>
+            <a:r>
+              <a:rPr lang="en-IE" dirty="0" smtClean="0"/>
+              <a:t>Look at </a:t>
+            </a:r>
+            <a:r>
+              <a:rPr lang="en-IE" dirty="0" smtClean="0">
+                <a:hlinkClick r:id="rId3"/>
+              </a:rPr>
+              <a:t>www.w3schools.com</a:t>
+            </a:r>
+            <a:r>
+              <a:rPr lang="en-IE" dirty="0" smtClean="0"/>
+              <a:t> and online for more </a:t>
+            </a:r>
+            <a:r>
+              <a:rPr lang="en-IE" dirty="0" err="1" smtClean="0"/>
+              <a:t>Javascript</a:t>
+            </a:r>
+            <a:r>
+              <a:rPr lang="en-IE" dirty="0" smtClean="0"/>
+              <a:t> tutorials</a:t>
+            </a:r>
+          </a:p>
+          <a:p>
+            <a:pPr marL="118872" indent="0">
+              <a:buNone/>
+            </a:pPr>
+            <a:endParaRPr lang="en-IE" dirty="0"/>
+          </a:p>
+          <a:p>
+            <a:pPr marL="118872" indent="0">
+              <a:buNone/>
+            </a:pPr>
+            <a:r>
+              <a:rPr lang="en-IE" dirty="0" smtClean="0"/>
+              <a:t>Send us the URLs of your websites to look at, to </a:t>
+            </a:r>
+            <a:r>
+              <a:rPr lang="en-IE" dirty="0" smtClean="0">
+                <a:hlinkClick r:id="rId4"/>
+              </a:rPr>
+              <a:t>bray@coderdojo.com</a:t>
+            </a:r>
+            <a:r>
+              <a:rPr lang="en-IE" dirty="0" smtClean="0"/>
+              <a:t> </a:t>
+            </a:r>
+          </a:p>
+          <a:p>
+            <a:pPr marL="118872" indent="0">
+              <a:buNone/>
+            </a:pPr>
+            <a:endParaRPr lang="en-IE" sz="2800" dirty="0" smtClean="0"/>
+          </a:p>
+        </p:txBody>
+      </p:sp>
+    </p:spTree>
+    <p:extLst>
+      <p:ext uri="{BB962C8B-B14F-4D97-AF65-F5344CB8AC3E}">
+        <p14:creationId xmlns:p14="http://schemas.microsoft.com/office/powerpoint/2010/main" val="2703784961"/>
       </p:ext>
     </p:extLst>
   </p:cSld>

</xml_diff>

<commit_message>
Some more of the Javascript .ppt filled in
</commit_message>
<xml_diff>
--- a/html/presentations/CoderDojoBrayHTML_session5.pptx
+++ b/html/presentations/CoderDojoBrayHTML_session5.pptx
@@ -5,7 +5,7 @@
     <p:sldMasterId id="2147483672" r:id="rId1"/>
   </p:sldMasterIdLst>
   <p:notesMasterIdLst>
-    <p:notesMasterId r:id="rId12"/>
+    <p:notesMasterId r:id="rId16"/>
   </p:notesMasterIdLst>
   <p:sldIdLst>
     <p:sldId id="256" r:id="rId2"/>
@@ -16,8 +16,12 @@
     <p:sldId id="290" r:id="rId7"/>
     <p:sldId id="291" r:id="rId8"/>
     <p:sldId id="286" r:id="rId9"/>
-    <p:sldId id="289" r:id="rId10"/>
-    <p:sldId id="288" r:id="rId11"/>
+    <p:sldId id="292" r:id="rId10"/>
+    <p:sldId id="293" r:id="rId11"/>
+    <p:sldId id="295" r:id="rId12"/>
+    <p:sldId id="296" r:id="rId13"/>
+    <p:sldId id="289" r:id="rId14"/>
+    <p:sldId id="288" r:id="rId15"/>
   </p:sldIdLst>
   <p:sldSz cx="9144000" cy="6858000" type="screen4x3"/>
   <p:notesSz cx="6858000" cy="9144000"/>
@@ -637,6 +641,342 @@
 </p:notes>
 </file>
 
+<file path=ppt/notesSlides/notesSlide11.xml><?xml version="1.0" encoding="utf-8"?>
+<p:notes xmlns:a="http://schemas.openxmlformats.org/drawingml/2006/main" xmlns:r="http://schemas.openxmlformats.org/officeDocument/2006/relationships" xmlns:p="http://schemas.openxmlformats.org/presentationml/2006/main">
+  <p:cSld>
+    <p:spTree>
+      <p:nvGrpSpPr>
+        <p:cNvPr id="1" name=""/>
+        <p:cNvGrpSpPr/>
+        <p:nvPr/>
+      </p:nvGrpSpPr>
+      <p:grpSpPr>
+        <a:xfrm>
+          <a:off x="0" y="0"/>
+          <a:ext cx="0" cy="0"/>
+          <a:chOff x="0" y="0"/>
+          <a:chExt cx="0" cy="0"/>
+        </a:xfrm>
+      </p:grpSpPr>
+      <p:sp>
+        <p:nvSpPr>
+          <p:cNvPr id="2" name="Slide Image Placeholder 1"/>
+          <p:cNvSpPr>
+            <a:spLocks noGrp="1" noRot="1" noChangeAspect="1"/>
+          </p:cNvSpPr>
+          <p:nvPr>
+            <p:ph type="sldImg"/>
+          </p:nvPr>
+        </p:nvSpPr>
+        <p:spPr/>
+      </p:sp>
+      <p:sp>
+        <p:nvSpPr>
+          <p:cNvPr id="3" name="Notes Placeholder 2"/>
+          <p:cNvSpPr>
+            <a:spLocks noGrp="1"/>
+          </p:cNvSpPr>
+          <p:nvPr>
+            <p:ph type="body" idx="1"/>
+          </p:nvPr>
+        </p:nvSpPr>
+        <p:spPr/>
+        <p:txBody>
+          <a:bodyPr/>
+          <a:lstStyle/>
+          <a:p>
+            <a:endParaRPr lang="en-IE" dirty="0"/>
+          </a:p>
+        </p:txBody>
+      </p:sp>
+      <p:sp>
+        <p:nvSpPr>
+          <p:cNvPr id="4" name="Slide Number Placeholder 3"/>
+          <p:cNvSpPr>
+            <a:spLocks noGrp="1"/>
+          </p:cNvSpPr>
+          <p:nvPr>
+            <p:ph type="sldNum" sz="quarter" idx="10"/>
+          </p:nvPr>
+        </p:nvSpPr>
+        <p:spPr/>
+        <p:txBody>
+          <a:bodyPr/>
+          <a:lstStyle/>
+          <a:p>
+            <a:fld id="{ABE5CB41-8F34-4FAE-BDD8-10A032863583}" type="slidenum">
+              <a:rPr lang="en-IE" smtClean="0"/>
+              <a:t>11</a:t>
+            </a:fld>
+            <a:endParaRPr lang="en-IE"/>
+          </a:p>
+        </p:txBody>
+      </p:sp>
+    </p:spTree>
+    <p:extLst>
+      <p:ext uri="{BB962C8B-B14F-4D97-AF65-F5344CB8AC3E}">
+        <p14:creationId xmlns:p14="http://schemas.microsoft.com/office/powerpoint/2010/main" val="2067379537"/>
+      </p:ext>
+    </p:extLst>
+  </p:cSld>
+  <p:clrMapOvr>
+    <a:masterClrMapping/>
+  </p:clrMapOvr>
+</p:notes>
+</file>
+
+<file path=ppt/notesSlides/notesSlide12.xml><?xml version="1.0" encoding="utf-8"?>
+<p:notes xmlns:a="http://schemas.openxmlformats.org/drawingml/2006/main" xmlns:r="http://schemas.openxmlformats.org/officeDocument/2006/relationships" xmlns:p="http://schemas.openxmlformats.org/presentationml/2006/main">
+  <p:cSld>
+    <p:spTree>
+      <p:nvGrpSpPr>
+        <p:cNvPr id="1" name=""/>
+        <p:cNvGrpSpPr/>
+        <p:nvPr/>
+      </p:nvGrpSpPr>
+      <p:grpSpPr>
+        <a:xfrm>
+          <a:off x="0" y="0"/>
+          <a:ext cx="0" cy="0"/>
+          <a:chOff x="0" y="0"/>
+          <a:chExt cx="0" cy="0"/>
+        </a:xfrm>
+      </p:grpSpPr>
+      <p:sp>
+        <p:nvSpPr>
+          <p:cNvPr id="2" name="Slide Image Placeholder 1"/>
+          <p:cNvSpPr>
+            <a:spLocks noGrp="1" noRot="1" noChangeAspect="1"/>
+          </p:cNvSpPr>
+          <p:nvPr>
+            <p:ph type="sldImg"/>
+          </p:nvPr>
+        </p:nvSpPr>
+        <p:spPr/>
+      </p:sp>
+      <p:sp>
+        <p:nvSpPr>
+          <p:cNvPr id="3" name="Notes Placeholder 2"/>
+          <p:cNvSpPr>
+            <a:spLocks noGrp="1"/>
+          </p:cNvSpPr>
+          <p:nvPr>
+            <p:ph type="body" idx="1"/>
+          </p:nvPr>
+        </p:nvSpPr>
+        <p:spPr/>
+        <p:txBody>
+          <a:bodyPr/>
+          <a:lstStyle/>
+          <a:p>
+            <a:endParaRPr lang="en-IE" dirty="0"/>
+          </a:p>
+        </p:txBody>
+      </p:sp>
+      <p:sp>
+        <p:nvSpPr>
+          <p:cNvPr id="4" name="Slide Number Placeholder 3"/>
+          <p:cNvSpPr>
+            <a:spLocks noGrp="1"/>
+          </p:cNvSpPr>
+          <p:nvPr>
+            <p:ph type="sldNum" sz="quarter" idx="10"/>
+          </p:nvPr>
+        </p:nvSpPr>
+        <p:spPr/>
+        <p:txBody>
+          <a:bodyPr/>
+          <a:lstStyle/>
+          <a:p>
+            <a:fld id="{ABE5CB41-8F34-4FAE-BDD8-10A032863583}" type="slidenum">
+              <a:rPr lang="en-IE" smtClean="0"/>
+              <a:t>12</a:t>
+            </a:fld>
+            <a:endParaRPr lang="en-IE"/>
+          </a:p>
+        </p:txBody>
+      </p:sp>
+    </p:spTree>
+    <p:extLst>
+      <p:ext uri="{BB962C8B-B14F-4D97-AF65-F5344CB8AC3E}">
+        <p14:creationId xmlns:p14="http://schemas.microsoft.com/office/powerpoint/2010/main" val="2067379537"/>
+      </p:ext>
+    </p:extLst>
+  </p:cSld>
+  <p:clrMapOvr>
+    <a:masterClrMapping/>
+  </p:clrMapOvr>
+</p:notes>
+</file>
+
+<file path=ppt/notesSlides/notesSlide13.xml><?xml version="1.0" encoding="utf-8"?>
+<p:notes xmlns:a="http://schemas.openxmlformats.org/drawingml/2006/main" xmlns:r="http://schemas.openxmlformats.org/officeDocument/2006/relationships" xmlns:p="http://schemas.openxmlformats.org/presentationml/2006/main">
+  <p:cSld>
+    <p:spTree>
+      <p:nvGrpSpPr>
+        <p:cNvPr id="1" name=""/>
+        <p:cNvGrpSpPr/>
+        <p:nvPr/>
+      </p:nvGrpSpPr>
+      <p:grpSpPr>
+        <a:xfrm>
+          <a:off x="0" y="0"/>
+          <a:ext cx="0" cy="0"/>
+          <a:chOff x="0" y="0"/>
+          <a:chExt cx="0" cy="0"/>
+        </a:xfrm>
+      </p:grpSpPr>
+      <p:sp>
+        <p:nvSpPr>
+          <p:cNvPr id="2" name="Slide Image Placeholder 1"/>
+          <p:cNvSpPr>
+            <a:spLocks noGrp="1" noRot="1" noChangeAspect="1"/>
+          </p:cNvSpPr>
+          <p:nvPr>
+            <p:ph type="sldImg"/>
+          </p:nvPr>
+        </p:nvSpPr>
+        <p:spPr/>
+      </p:sp>
+      <p:sp>
+        <p:nvSpPr>
+          <p:cNvPr id="3" name="Notes Placeholder 2"/>
+          <p:cNvSpPr>
+            <a:spLocks noGrp="1"/>
+          </p:cNvSpPr>
+          <p:nvPr>
+            <p:ph type="body" idx="1"/>
+          </p:nvPr>
+        </p:nvSpPr>
+        <p:spPr/>
+        <p:txBody>
+          <a:bodyPr/>
+          <a:lstStyle/>
+          <a:p>
+            <a:endParaRPr lang="en-IE" baseline="0" dirty="0" smtClean="0"/>
+          </a:p>
+        </p:txBody>
+      </p:sp>
+      <p:sp>
+        <p:nvSpPr>
+          <p:cNvPr id="4" name="Slide Number Placeholder 3"/>
+          <p:cNvSpPr>
+            <a:spLocks noGrp="1"/>
+          </p:cNvSpPr>
+          <p:nvPr>
+            <p:ph type="sldNum" sz="quarter" idx="10"/>
+          </p:nvPr>
+        </p:nvSpPr>
+        <p:spPr/>
+        <p:txBody>
+          <a:bodyPr/>
+          <a:lstStyle/>
+          <a:p>
+            <a:fld id="{ABE5CB41-8F34-4FAE-BDD8-10A032863583}" type="slidenum">
+              <a:rPr lang="en-IE" smtClean="0"/>
+              <a:t>13</a:t>
+            </a:fld>
+            <a:endParaRPr lang="en-IE"/>
+          </a:p>
+        </p:txBody>
+      </p:sp>
+    </p:spTree>
+    <p:extLst>
+      <p:ext uri="{BB962C8B-B14F-4D97-AF65-F5344CB8AC3E}">
+        <p14:creationId xmlns:p14="http://schemas.microsoft.com/office/powerpoint/2010/main" val="2154761357"/>
+      </p:ext>
+    </p:extLst>
+  </p:cSld>
+  <p:clrMapOvr>
+    <a:masterClrMapping/>
+  </p:clrMapOvr>
+</p:notes>
+</file>
+
+<file path=ppt/notesSlides/notesSlide14.xml><?xml version="1.0" encoding="utf-8"?>
+<p:notes xmlns:a="http://schemas.openxmlformats.org/drawingml/2006/main" xmlns:r="http://schemas.openxmlformats.org/officeDocument/2006/relationships" xmlns:p="http://schemas.openxmlformats.org/presentationml/2006/main">
+  <p:cSld>
+    <p:spTree>
+      <p:nvGrpSpPr>
+        <p:cNvPr id="1" name=""/>
+        <p:cNvGrpSpPr/>
+        <p:nvPr/>
+      </p:nvGrpSpPr>
+      <p:grpSpPr>
+        <a:xfrm>
+          <a:off x="0" y="0"/>
+          <a:ext cx="0" cy="0"/>
+          <a:chOff x="0" y="0"/>
+          <a:chExt cx="0" cy="0"/>
+        </a:xfrm>
+      </p:grpSpPr>
+      <p:sp>
+        <p:nvSpPr>
+          <p:cNvPr id="2" name="Slide Image Placeholder 1"/>
+          <p:cNvSpPr>
+            <a:spLocks noGrp="1" noRot="1" noChangeAspect="1"/>
+          </p:cNvSpPr>
+          <p:nvPr>
+            <p:ph type="sldImg"/>
+          </p:nvPr>
+        </p:nvSpPr>
+        <p:spPr/>
+      </p:sp>
+      <p:sp>
+        <p:nvSpPr>
+          <p:cNvPr id="3" name="Notes Placeholder 2"/>
+          <p:cNvSpPr>
+            <a:spLocks noGrp="1"/>
+          </p:cNvSpPr>
+          <p:nvPr>
+            <p:ph type="body" idx="1"/>
+          </p:nvPr>
+        </p:nvSpPr>
+        <p:spPr/>
+        <p:txBody>
+          <a:bodyPr/>
+          <a:lstStyle/>
+          <a:p>
+            <a:endParaRPr lang="en-IE" dirty="0"/>
+          </a:p>
+        </p:txBody>
+      </p:sp>
+      <p:sp>
+        <p:nvSpPr>
+          <p:cNvPr id="4" name="Slide Number Placeholder 3"/>
+          <p:cNvSpPr>
+            <a:spLocks noGrp="1"/>
+          </p:cNvSpPr>
+          <p:nvPr>
+            <p:ph type="sldNum" sz="quarter" idx="10"/>
+          </p:nvPr>
+        </p:nvSpPr>
+        <p:spPr/>
+        <p:txBody>
+          <a:bodyPr/>
+          <a:lstStyle/>
+          <a:p>
+            <a:fld id="{ABE5CB41-8F34-4FAE-BDD8-10A032863583}" type="slidenum">
+              <a:rPr lang="en-IE" smtClean="0"/>
+              <a:t>14</a:t>
+            </a:fld>
+            <a:endParaRPr lang="en-IE"/>
+          </a:p>
+        </p:txBody>
+      </p:sp>
+    </p:spTree>
+    <p:extLst>
+      <p:ext uri="{BB962C8B-B14F-4D97-AF65-F5344CB8AC3E}">
+        <p14:creationId xmlns:p14="http://schemas.microsoft.com/office/powerpoint/2010/main" val="2067379537"/>
+      </p:ext>
+    </p:extLst>
+  </p:cSld>
+  <p:clrMapOvr>
+    <a:masterClrMapping/>
+  </p:clrMapOvr>
+</p:notes>
+</file>
+
 <file path=ppt/notesSlides/notesSlide2.xml><?xml version="1.0" encoding="utf-8"?>
 <p:notes xmlns:a="http://schemas.openxmlformats.org/drawingml/2006/main" xmlns:r="http://schemas.openxmlformats.org/officeDocument/2006/relationships" xmlns:p="http://schemas.openxmlformats.org/presentationml/2006/main">
   <p:cSld>
@@ -1302,7 +1642,7 @@
           <a:bodyPr/>
           <a:lstStyle/>
           <a:p>
-            <a:endParaRPr lang="en-IE" baseline="0" dirty="0" smtClean="0"/>
+            <a:endParaRPr lang="en-IE" dirty="0"/>
           </a:p>
         </p:txBody>
       </p:sp>
@@ -1332,7 +1672,7 @@
     </p:spTree>
     <p:extLst>
       <p:ext uri="{BB962C8B-B14F-4D97-AF65-F5344CB8AC3E}">
-        <p14:creationId xmlns:p14="http://schemas.microsoft.com/office/powerpoint/2010/main" val="2154761357"/>
+        <p14:creationId xmlns:p14="http://schemas.microsoft.com/office/powerpoint/2010/main" val="2067379537"/>
       </p:ext>
     </p:extLst>
   </p:cSld>
@@ -5243,6 +5583,627 @@
           <a:p>
             <a:r>
               <a:rPr lang="en-IE" dirty="0" smtClean="0"/>
+              <a:t>Basic </a:t>
+            </a:r>
+            <a:r>
+              <a:rPr lang="en-IE" dirty="0" err="1" smtClean="0"/>
+              <a:t>Javascript</a:t>
+            </a:r>
+            <a:endParaRPr lang="en-IE" dirty="0"/>
+          </a:p>
+        </p:txBody>
+      </p:sp>
+      <p:sp>
+        <p:nvSpPr>
+          <p:cNvPr id="3" name="Content Placeholder 2"/>
+          <p:cNvSpPr>
+            <a:spLocks noGrp="1"/>
+          </p:cNvSpPr>
+          <p:nvPr>
+            <p:ph idx="1"/>
+          </p:nvPr>
+        </p:nvSpPr>
+        <p:spPr/>
+        <p:txBody>
+          <a:bodyPr>
+            <a:normAutofit/>
+          </a:bodyPr>
+          <a:lstStyle/>
+          <a:p>
+            <a:r>
+              <a:rPr lang="en-IE" dirty="0" smtClean="0"/>
+              <a:t>If you entered that correctly, you should now have coloured rectangles on screen</a:t>
+            </a:r>
+          </a:p>
+          <a:p>
+            <a:r>
+              <a:rPr lang="en-IE" dirty="0" smtClean="0"/>
+              <a:t>Where did the colours come from?</a:t>
+            </a:r>
+          </a:p>
+          <a:p>
+            <a:pPr lvl="1"/>
+            <a:r>
+              <a:rPr lang="en-IE" dirty="0" smtClean="0"/>
+              <a:t>Not the HTML source code</a:t>
+            </a:r>
+          </a:p>
+          <a:p>
+            <a:pPr lvl="1"/>
+            <a:r>
+              <a:rPr lang="en-IE" dirty="0" smtClean="0"/>
+              <a:t>Not the CSS</a:t>
+            </a:r>
+          </a:p>
+          <a:p>
+            <a:pPr lvl="1"/>
+            <a:r>
+              <a:rPr lang="en-US" dirty="0" smtClean="0"/>
+              <a:t>The </a:t>
+            </a:r>
+            <a:r>
+              <a:rPr lang="en-US" dirty="0" err="1" smtClean="0"/>
+              <a:t>Javascript</a:t>
+            </a:r>
+            <a:r>
+              <a:rPr lang="en-US" dirty="0" smtClean="0"/>
+              <a:t> code set the background </a:t>
+            </a:r>
+            <a:r>
+              <a:rPr lang="en-US" dirty="0" err="1" smtClean="0"/>
+              <a:t>colour</a:t>
+            </a:r>
+            <a:r>
+              <a:rPr lang="en-US" dirty="0" smtClean="0"/>
+              <a:t>!</a:t>
+            </a:r>
+          </a:p>
+          <a:p>
+            <a:r>
+              <a:rPr lang="en-US" dirty="0" smtClean="0"/>
+              <a:t>View the page in Chrome Developer Tools</a:t>
+            </a:r>
+            <a:endParaRPr lang="en-IE" dirty="0" smtClean="0"/>
+          </a:p>
+          <a:p>
+            <a:endParaRPr lang="en-IE" dirty="0" smtClean="0"/>
+          </a:p>
+        </p:txBody>
+      </p:sp>
+    </p:spTree>
+    <p:extLst>
+      <p:ext uri="{BB962C8B-B14F-4D97-AF65-F5344CB8AC3E}">
+        <p14:creationId xmlns:p14="http://schemas.microsoft.com/office/powerpoint/2010/main" val="3004552817"/>
+      </p:ext>
+    </p:extLst>
+  </p:cSld>
+  <p:clrMapOvr>
+    <a:masterClrMapping/>
+  </p:clrMapOvr>
+  <p:timing>
+    <p:tnLst>
+      <p:par>
+        <p:cTn id="1" dur="indefinite" restart="never" nodeType="tmRoot"/>
+      </p:par>
+    </p:tnLst>
+  </p:timing>
+</p:sld>
+</file>
+
+<file path=ppt/slides/slide11.xml><?xml version="1.0" encoding="utf-8"?>
+<p:sld xmlns:a="http://schemas.openxmlformats.org/drawingml/2006/main" xmlns:r="http://schemas.openxmlformats.org/officeDocument/2006/relationships" xmlns:p="http://schemas.openxmlformats.org/presentationml/2006/main">
+  <p:cSld>
+    <p:spTree>
+      <p:nvGrpSpPr>
+        <p:cNvPr id="1" name=""/>
+        <p:cNvGrpSpPr/>
+        <p:nvPr/>
+      </p:nvGrpSpPr>
+      <p:grpSpPr>
+        <a:xfrm>
+          <a:off x="0" y="0"/>
+          <a:ext cx="0" cy="0"/>
+          <a:chOff x="0" y="0"/>
+          <a:chExt cx="0" cy="0"/>
+        </a:xfrm>
+      </p:grpSpPr>
+      <p:sp>
+        <p:nvSpPr>
+          <p:cNvPr id="2" name="Title 1"/>
+          <p:cNvSpPr>
+            <a:spLocks noGrp="1"/>
+          </p:cNvSpPr>
+          <p:nvPr>
+            <p:ph type="title"/>
+          </p:nvPr>
+        </p:nvSpPr>
+        <p:spPr>
+          <a:xfrm>
+            <a:off x="1571625" y="155448"/>
+            <a:ext cx="7115175" cy="1252728"/>
+          </a:xfrm>
+        </p:spPr>
+        <p:txBody>
+          <a:bodyPr>
+            <a:normAutofit/>
+          </a:bodyPr>
+          <a:lstStyle/>
+          <a:p>
+            <a:r>
+              <a:rPr lang="en-IE" dirty="0" smtClean="0"/>
+              <a:t>Understanding </a:t>
+            </a:r>
+            <a:r>
+              <a:rPr lang="en-IE" dirty="0" err="1" smtClean="0"/>
+              <a:t>Javascript</a:t>
+            </a:r>
+            <a:endParaRPr lang="en-IE" dirty="0"/>
+          </a:p>
+        </p:txBody>
+      </p:sp>
+      <p:sp>
+        <p:nvSpPr>
+          <p:cNvPr id="3" name="Content Placeholder 2"/>
+          <p:cNvSpPr>
+            <a:spLocks noGrp="1"/>
+          </p:cNvSpPr>
+          <p:nvPr>
+            <p:ph idx="1"/>
+          </p:nvPr>
+        </p:nvSpPr>
+        <p:spPr/>
+        <p:txBody>
+          <a:bodyPr>
+            <a:normAutofit/>
+          </a:bodyPr>
+          <a:lstStyle/>
+          <a:p>
+            <a:r>
+              <a:rPr lang="en-US" dirty="0" err="1" smtClean="0"/>
+              <a:t>Javascript</a:t>
+            </a:r>
+            <a:r>
+              <a:rPr lang="en-US" dirty="0" smtClean="0"/>
+              <a:t> works using the DOM</a:t>
+            </a:r>
+          </a:p>
+          <a:p>
+            <a:pPr lvl="1"/>
+            <a:r>
+              <a:rPr lang="en-US" dirty="0" smtClean="0"/>
+              <a:t>Document Object Model</a:t>
+            </a:r>
+          </a:p>
+          <a:p>
+            <a:endParaRPr lang="en-US" dirty="0" smtClean="0"/>
+          </a:p>
+          <a:p>
+            <a:r>
+              <a:rPr lang="en-US" dirty="0" smtClean="0"/>
+              <a:t>The DOM is a “tree” structure representing</a:t>
+            </a:r>
+          </a:p>
+          <a:p>
+            <a:pPr lvl="1"/>
+            <a:r>
+              <a:rPr lang="en-US" dirty="0" smtClean="0"/>
+              <a:t>The window displayed by the browser</a:t>
+            </a:r>
+          </a:p>
+          <a:p>
+            <a:pPr lvl="1"/>
+            <a:r>
+              <a:rPr lang="en-US" dirty="0" smtClean="0"/>
+              <a:t>The document in that window </a:t>
+            </a:r>
+          </a:p>
+          <a:p>
+            <a:pPr lvl="1"/>
+            <a:r>
+              <a:rPr lang="en-US" dirty="0"/>
+              <a:t>T</a:t>
+            </a:r>
+            <a:r>
+              <a:rPr lang="en-US" dirty="0" smtClean="0"/>
+              <a:t>he elements (HTML tags) inside that document</a:t>
+            </a:r>
+            <a:endParaRPr lang="en-US" dirty="0" smtClean="0"/>
+          </a:p>
+          <a:p>
+            <a:pPr lvl="1"/>
+            <a:endParaRPr lang="en-IE" dirty="0" smtClean="0"/>
+          </a:p>
+        </p:txBody>
+      </p:sp>
+    </p:spTree>
+    <p:extLst>
+      <p:ext uri="{BB962C8B-B14F-4D97-AF65-F5344CB8AC3E}">
+        <p14:creationId xmlns:p14="http://schemas.microsoft.com/office/powerpoint/2010/main" val="3245698057"/>
+      </p:ext>
+    </p:extLst>
+  </p:cSld>
+  <p:clrMapOvr>
+    <a:masterClrMapping/>
+  </p:clrMapOvr>
+  <p:timing>
+    <p:tnLst>
+      <p:par>
+        <p:cTn id="1" dur="indefinite" restart="never" nodeType="tmRoot"/>
+      </p:par>
+    </p:tnLst>
+  </p:timing>
+</p:sld>
+</file>
+
+<file path=ppt/slides/slide12.xml><?xml version="1.0" encoding="utf-8"?>
+<p:sld xmlns:a="http://schemas.openxmlformats.org/drawingml/2006/main" xmlns:r="http://schemas.openxmlformats.org/officeDocument/2006/relationships" xmlns:p="http://schemas.openxmlformats.org/presentationml/2006/main">
+  <p:cSld>
+    <p:spTree>
+      <p:nvGrpSpPr>
+        <p:cNvPr id="1" name=""/>
+        <p:cNvGrpSpPr/>
+        <p:nvPr/>
+      </p:nvGrpSpPr>
+      <p:grpSpPr>
+        <a:xfrm>
+          <a:off x="0" y="0"/>
+          <a:ext cx="0" cy="0"/>
+          <a:chOff x="0" y="0"/>
+          <a:chExt cx="0" cy="0"/>
+        </a:xfrm>
+      </p:grpSpPr>
+      <p:sp>
+        <p:nvSpPr>
+          <p:cNvPr id="2" name="Title 1"/>
+          <p:cNvSpPr>
+            <a:spLocks noGrp="1"/>
+          </p:cNvSpPr>
+          <p:nvPr>
+            <p:ph type="title"/>
+          </p:nvPr>
+        </p:nvSpPr>
+        <p:spPr>
+          <a:xfrm>
+            <a:off x="1571625" y="155448"/>
+            <a:ext cx="7115175" cy="1252728"/>
+          </a:xfrm>
+        </p:spPr>
+        <p:txBody>
+          <a:bodyPr>
+            <a:normAutofit/>
+          </a:bodyPr>
+          <a:lstStyle/>
+          <a:p>
+            <a:r>
+              <a:rPr lang="en-IE" dirty="0" smtClean="0"/>
+              <a:t>The DOM</a:t>
+            </a:r>
+            <a:endParaRPr lang="en-IE" dirty="0"/>
+          </a:p>
+        </p:txBody>
+      </p:sp>
+      <p:sp>
+        <p:nvSpPr>
+          <p:cNvPr id="3" name="Content Placeholder 2"/>
+          <p:cNvSpPr>
+            <a:spLocks noGrp="1"/>
+          </p:cNvSpPr>
+          <p:nvPr>
+            <p:ph idx="1"/>
+          </p:nvPr>
+        </p:nvSpPr>
+        <p:spPr>
+          <a:xfrm>
+            <a:off x="457200" y="1628800"/>
+            <a:ext cx="8229600" cy="4772002"/>
+          </a:xfrm>
+        </p:spPr>
+        <p:txBody>
+          <a:bodyPr>
+            <a:normAutofit/>
+          </a:bodyPr>
+          <a:lstStyle/>
+          <a:p>
+            <a:pPr lvl="1"/>
+            <a:endParaRPr lang="en-IE" dirty="0" smtClean="0"/>
+          </a:p>
+        </p:txBody>
+      </p:sp>
+      <p:pic>
+        <p:nvPicPr>
+          <p:cNvPr id="1027" name="Picture 3"/>
+          <p:cNvPicPr>
+            <a:picLocks noChangeAspect="1" noChangeArrowheads="1"/>
+          </p:cNvPicPr>
+          <p:nvPr/>
+        </p:nvPicPr>
+        <p:blipFill>
+          <a:blip r:embed="rId3">
+            <a:extLst>
+              <a:ext uri="{28A0092B-C50C-407E-A947-70E740481C1C}">
+                <a14:useLocalDpi xmlns:a14="http://schemas.microsoft.com/office/drawing/2010/main" val="0"/>
+              </a:ext>
+            </a:extLst>
+          </a:blip>
+          <a:srcRect/>
+          <a:stretch>
+            <a:fillRect/>
+          </a:stretch>
+        </p:blipFill>
+        <p:spPr bwMode="auto">
+          <a:xfrm>
+            <a:off x="539552" y="1628800"/>
+            <a:ext cx="8208912" cy="5099935"/>
+          </a:xfrm>
+          <a:prstGeom prst="rect">
+            <a:avLst/>
+          </a:prstGeom>
+          <a:noFill/>
+          <a:ln>
+            <a:noFill/>
+          </a:ln>
+          <a:effectLst/>
+          <a:extLst>
+            <a:ext uri="{909E8E84-426E-40DD-AFC4-6F175D3DCCD1}">
+              <a14:hiddenFill xmlns:a14="http://schemas.microsoft.com/office/drawing/2010/main">
+                <a:solidFill>
+                  <a:schemeClr val="accent1"/>
+                </a:solidFill>
+              </a14:hiddenFill>
+            </a:ext>
+            <a:ext uri="{91240B29-F687-4F45-9708-019B960494DF}">
+              <a14:hiddenLine xmlns:a14="http://schemas.microsoft.com/office/drawing/2010/main" w="9525">
+                <a:solidFill>
+                  <a:schemeClr val="tx1"/>
+                </a:solidFill>
+                <a:miter lim="800000"/>
+                <a:headEnd/>
+                <a:tailEnd/>
+              </a14:hiddenLine>
+            </a:ext>
+            <a:ext uri="{AF507438-7753-43E0-B8FC-AC1667EBCBE1}">
+              <a14:hiddenEffects xmlns:a14="http://schemas.microsoft.com/office/drawing/2010/main">
+                <a:effectLst>
+                  <a:outerShdw dist="35921" dir="2700000" algn="ctr" rotWithShape="0">
+                    <a:schemeClr val="bg2"/>
+                  </a:outerShdw>
+                </a:effectLst>
+              </a14:hiddenEffects>
+            </a:ext>
+          </a:extLst>
+        </p:spPr>
+      </p:pic>
+    </p:spTree>
+    <p:extLst>
+      <p:ext uri="{BB962C8B-B14F-4D97-AF65-F5344CB8AC3E}">
+        <p14:creationId xmlns:p14="http://schemas.microsoft.com/office/powerpoint/2010/main" val="400551625"/>
+      </p:ext>
+    </p:extLst>
+  </p:cSld>
+  <p:clrMapOvr>
+    <a:masterClrMapping/>
+  </p:clrMapOvr>
+  <p:timing>
+    <p:tnLst>
+      <p:par>
+        <p:cTn id="1" dur="indefinite" restart="never" nodeType="tmRoot"/>
+      </p:par>
+    </p:tnLst>
+  </p:timing>
+</p:sld>
+</file>
+
+<file path=ppt/slides/slide13.xml><?xml version="1.0" encoding="utf-8"?>
+<p:sld xmlns:a="http://schemas.openxmlformats.org/drawingml/2006/main" xmlns:r="http://schemas.openxmlformats.org/officeDocument/2006/relationships" xmlns:p="http://schemas.openxmlformats.org/presentationml/2006/main">
+  <p:cSld>
+    <p:spTree>
+      <p:nvGrpSpPr>
+        <p:cNvPr id="1" name=""/>
+        <p:cNvGrpSpPr/>
+        <p:nvPr/>
+      </p:nvGrpSpPr>
+      <p:grpSpPr>
+        <a:xfrm>
+          <a:off x="0" y="0"/>
+          <a:ext cx="0" cy="0"/>
+          <a:chOff x="0" y="0"/>
+          <a:chExt cx="0" cy="0"/>
+        </a:xfrm>
+      </p:grpSpPr>
+      <p:sp>
+        <p:nvSpPr>
+          <p:cNvPr id="2" name="Title 1"/>
+          <p:cNvSpPr>
+            <a:spLocks noGrp="1"/>
+          </p:cNvSpPr>
+          <p:nvPr>
+            <p:ph type="title"/>
+          </p:nvPr>
+        </p:nvSpPr>
+        <p:spPr/>
+        <p:txBody>
+          <a:bodyPr/>
+          <a:lstStyle/>
+          <a:p>
+            <a:r>
+              <a:rPr lang="en-IE" dirty="0" smtClean="0"/>
+              <a:t>Now Practice Some More!</a:t>
+            </a:r>
+            <a:endParaRPr lang="en-IE" dirty="0"/>
+          </a:p>
+        </p:txBody>
+      </p:sp>
+      <p:sp>
+        <p:nvSpPr>
+          <p:cNvPr id="3" name="Content Placeholder 2"/>
+          <p:cNvSpPr>
+            <a:spLocks noGrp="1"/>
+          </p:cNvSpPr>
+          <p:nvPr>
+            <p:ph idx="1"/>
+          </p:nvPr>
+        </p:nvSpPr>
+        <p:spPr/>
+        <p:txBody>
+          <a:bodyPr>
+            <a:normAutofit/>
+          </a:bodyPr>
+          <a:lstStyle/>
+          <a:p>
+            <a:pPr marL="118872" indent="0">
+              <a:buNone/>
+            </a:pPr>
+            <a:r>
+              <a:rPr lang="en-IE" dirty="0" smtClean="0"/>
+              <a:t>At </a:t>
+            </a:r>
+            <a:r>
+              <a:rPr lang="en-IE" dirty="0"/>
+              <a:t>home, practice what you learned this week</a:t>
+            </a:r>
+          </a:p>
+          <a:p>
+            <a:pPr marL="118872" indent="0">
+              <a:buNone/>
+            </a:pPr>
+            <a:endParaRPr lang="en-IE" dirty="0" smtClean="0"/>
+          </a:p>
+          <a:p>
+            <a:pPr marL="118872" indent="0">
+              <a:buNone/>
+            </a:pPr>
+            <a:r>
+              <a:rPr lang="en-IE" dirty="0" smtClean="0"/>
+              <a:t>Upload your work to dojo.hallamor.org</a:t>
+            </a:r>
+          </a:p>
+          <a:p>
+            <a:pPr marL="118872" indent="0">
+              <a:buNone/>
+            </a:pPr>
+            <a:endParaRPr lang="en-IE" dirty="0"/>
+          </a:p>
+          <a:p>
+            <a:pPr marL="118872" indent="0">
+              <a:buNone/>
+            </a:pPr>
+            <a:r>
+              <a:rPr lang="en-IE" dirty="0" smtClean="0"/>
+              <a:t>Look at </a:t>
+            </a:r>
+            <a:r>
+              <a:rPr lang="en-IE" dirty="0" smtClean="0">
+                <a:hlinkClick r:id="rId3"/>
+              </a:rPr>
+              <a:t>www.w3schools.com</a:t>
+            </a:r>
+            <a:r>
+              <a:rPr lang="en-IE" dirty="0" smtClean="0"/>
+              <a:t> and online for more </a:t>
+            </a:r>
+            <a:r>
+              <a:rPr lang="en-IE" dirty="0" err="1" smtClean="0"/>
+              <a:t>Javascript</a:t>
+            </a:r>
+            <a:r>
+              <a:rPr lang="en-IE" dirty="0" smtClean="0"/>
+              <a:t> tutorials</a:t>
+            </a:r>
+          </a:p>
+          <a:p>
+            <a:pPr marL="118872" indent="0">
+              <a:buNone/>
+            </a:pPr>
+            <a:endParaRPr lang="en-IE" dirty="0"/>
+          </a:p>
+          <a:p>
+            <a:pPr marL="118872" indent="0">
+              <a:buNone/>
+            </a:pPr>
+            <a:r>
+              <a:rPr lang="en-IE" dirty="0" smtClean="0"/>
+              <a:t>Send us the URLs of your websites to look at, to </a:t>
+            </a:r>
+            <a:r>
+              <a:rPr lang="en-IE" dirty="0" smtClean="0">
+                <a:hlinkClick r:id="rId4"/>
+              </a:rPr>
+              <a:t>bray@coderdojo.com</a:t>
+            </a:r>
+            <a:r>
+              <a:rPr lang="en-IE" dirty="0" smtClean="0"/>
+              <a:t> </a:t>
+            </a:r>
+          </a:p>
+          <a:p>
+            <a:pPr marL="118872" indent="0">
+              <a:buNone/>
+            </a:pPr>
+            <a:endParaRPr lang="en-IE" sz="2800" dirty="0" smtClean="0"/>
+          </a:p>
+        </p:txBody>
+      </p:sp>
+    </p:spTree>
+    <p:extLst>
+      <p:ext uri="{BB962C8B-B14F-4D97-AF65-F5344CB8AC3E}">
+        <p14:creationId xmlns:p14="http://schemas.microsoft.com/office/powerpoint/2010/main" val="2703784961"/>
+      </p:ext>
+    </p:extLst>
+  </p:cSld>
+  <p:clrMapOvr>
+    <a:masterClrMapping/>
+  </p:clrMapOvr>
+  <p:timing>
+    <p:tnLst>
+      <p:par>
+        <p:cTn id="1" dur="indefinite" restart="never" nodeType="tmRoot"/>
+      </p:par>
+    </p:tnLst>
+  </p:timing>
+</p:sld>
+</file>
+
+<file path=ppt/slides/slide14.xml><?xml version="1.0" encoding="utf-8"?>
+<p:sld xmlns:a="http://schemas.openxmlformats.org/drawingml/2006/main" xmlns:r="http://schemas.openxmlformats.org/officeDocument/2006/relationships" xmlns:p="http://schemas.openxmlformats.org/presentationml/2006/main">
+  <p:cSld>
+    <p:spTree>
+      <p:nvGrpSpPr>
+        <p:cNvPr id="1" name=""/>
+        <p:cNvGrpSpPr/>
+        <p:nvPr/>
+      </p:nvGrpSpPr>
+      <p:grpSpPr>
+        <a:xfrm>
+          <a:off x="0" y="0"/>
+          <a:ext cx="0" cy="0"/>
+          <a:chOff x="0" y="0"/>
+          <a:chExt cx="0" cy="0"/>
+        </a:xfrm>
+      </p:grpSpPr>
+      <p:sp>
+        <p:nvSpPr>
+          <p:cNvPr id="2" name="Title 1"/>
+          <p:cNvSpPr>
+            <a:spLocks noGrp="1"/>
+          </p:cNvSpPr>
+          <p:nvPr>
+            <p:ph type="title"/>
+          </p:nvPr>
+        </p:nvSpPr>
+        <p:spPr>
+          <a:xfrm>
+            <a:off x="1571625" y="155448"/>
+            <a:ext cx="7115175" cy="1252728"/>
+          </a:xfrm>
+        </p:spPr>
+        <p:txBody>
+          <a:bodyPr>
+            <a:normAutofit/>
+          </a:bodyPr>
+          <a:lstStyle/>
+          <a:p>
+            <a:r>
+              <a:rPr lang="en-IE" dirty="0" smtClean="0"/>
               <a:t>Next Week @ CoderDojo</a:t>
             </a:r>
             <a:endParaRPr lang="en-IE" dirty="0"/>
@@ -5303,13 +6264,8 @@
           <a:p>
             <a:r>
               <a:rPr lang="en-IE" dirty="0" smtClean="0"/>
-              <a:t>…and </a:t>
-            </a:r>
-            <a:r>
-              <a:rPr lang="en-IE" dirty="0" smtClean="0"/>
-              <a:t>we can go over anything not clear from any of the earlier sessions … </a:t>
-            </a:r>
-            <a:endParaRPr lang="en-IE" dirty="0" smtClean="0"/>
+              <a:t>…and we can go over anything not clear from any of the earlier sessions … </a:t>
+            </a:r>
           </a:p>
           <a:p>
             <a:endParaRPr lang="en-IE" dirty="0" smtClean="0"/>
@@ -5473,6 +6429,13 @@
   <p:clrMapOvr>
     <a:masterClrMapping/>
   </p:clrMapOvr>
+  <p:timing>
+    <p:tnLst>
+      <p:par>
+        <p:cTn id="1" dur="indefinite" restart="never" nodeType="tmRoot"/>
+      </p:par>
+    </p:tnLst>
+  </p:timing>
 </p:sld>
 </file>
 
@@ -5860,11 +6823,7 @@
             </a:r>
             <a:r>
               <a:rPr lang="en-IE" dirty="0" smtClean="0"/>
-              <a:t> </a:t>
-            </a:r>
-            <a:r>
-              <a:rPr lang="en-IE" dirty="0" smtClean="0"/>
-              <a:t>is a programming language</a:t>
+              <a:t> is a programming language</a:t>
             </a:r>
           </a:p>
           <a:p>
@@ -5927,7 +6886,6 @@
               <a:rPr lang="en-IE" dirty="0" smtClean="0"/>
               <a:t>In the top 5 most used languages worldwide</a:t>
             </a:r>
-            <a:endParaRPr lang="en-IE" dirty="0" smtClean="0"/>
           </a:p>
         </p:txBody>
       </p:sp>
@@ -5992,11 +6950,7 @@
           <a:p>
             <a:r>
               <a:rPr lang="en-IE" dirty="0" smtClean="0"/>
-              <a:t>Learning </a:t>
-            </a:r>
-            <a:r>
-              <a:rPr lang="en-IE" dirty="0" smtClean="0"/>
-              <a:t>Programming</a:t>
+              <a:t>Learning Programming</a:t>
             </a:r>
             <a:endParaRPr lang="en-IE" dirty="0"/>
           </a:p>
@@ -6183,7 +7137,7 @@
         <p:spPr/>
         <p:txBody>
           <a:bodyPr>
-            <a:normAutofit fontScale="92500" lnSpcReduction="10000"/>
+            <a:normAutofit lnSpcReduction="10000"/>
           </a:bodyPr>
           <a:lstStyle/>
           <a:p>
@@ -6204,14 +7158,19 @@
             <a:pPr lvl="1"/>
             <a:r>
               <a:rPr lang="en-US" dirty="0" smtClean="0"/>
-              <a:t>React when the user does something (like presses a key or clicks the mouse)</a:t>
-            </a:r>
+              <a:t>React when the user does something </a:t>
+            </a:r>
+            <a:endParaRPr lang="en-US" dirty="0" smtClean="0"/>
           </a:p>
           <a:p>
             <a:pPr lvl="1"/>
             <a:r>
               <a:rPr lang="en-US" dirty="0" smtClean="0"/>
-              <a:t>Access anything on the web page and change its content, or style, or attributes</a:t>
+              <a:t>Access </a:t>
+            </a:r>
+            <a:r>
+              <a:rPr lang="en-US" dirty="0" smtClean="0"/>
+              <a:t>anything on the web page and change its content, or style, or attributes</a:t>
             </a:r>
           </a:p>
           <a:p>
@@ -6232,11 +7191,7 @@
           <a:p>
             <a:r>
               <a:rPr lang="en-US" dirty="0" smtClean="0"/>
-              <a:t>In other words, your web page can change on th</a:t>
-            </a:r>
-            <a:r>
-              <a:rPr lang="en-US" dirty="0" smtClean="0"/>
-              <a:t>e fly</a:t>
+              <a:t>In other words, your web page can change on the fly</a:t>
             </a:r>
             <a:endParaRPr lang="en-IE" dirty="0" smtClean="0"/>
           </a:p>
@@ -6303,7 +7258,7 @@
           <a:p>
             <a:r>
               <a:rPr lang="en-IE" dirty="0" smtClean="0"/>
-              <a:t>For the time remaining …</a:t>
+              <a:t>Let’s get ready …</a:t>
             </a:r>
             <a:endParaRPr lang="en-IE" dirty="0"/>
           </a:p>
@@ -6328,8 +7283,54 @@
           <a:p>
             <a:r>
               <a:rPr lang="en-IE" dirty="0" smtClean="0"/>
-              <a:t>Try to …do stuff … </a:t>
-            </a:r>
+              <a:t>We’re going to use </a:t>
+            </a:r>
+            <a:r>
+              <a:rPr lang="en-IE" dirty="0" err="1" smtClean="0"/>
+              <a:t>Javascript</a:t>
+            </a:r>
+            <a:r>
+              <a:rPr lang="en-IE" dirty="0" smtClean="0"/>
+              <a:t> to change a webpage</a:t>
+            </a:r>
+          </a:p>
+          <a:p>
+            <a:r>
+              <a:rPr lang="en-IE" dirty="0" smtClean="0"/>
+              <a:t>First, let’s make a basic web page based on last week’s column layout</a:t>
+            </a:r>
+          </a:p>
+          <a:p>
+            <a:endParaRPr lang="en-IE" dirty="0" smtClean="0"/>
+          </a:p>
+          <a:p>
+            <a:r>
+              <a:rPr lang="en-IE" dirty="0" smtClean="0"/>
+              <a:t>Start an empty page – or take last week’s page</a:t>
+            </a:r>
+          </a:p>
+          <a:p>
+            <a:pPr lvl="1"/>
+            <a:r>
+              <a:rPr lang="en-IE" dirty="0" smtClean="0"/>
+              <a:t>Or download the sample that we have provided</a:t>
+            </a:r>
+          </a:p>
+          <a:p>
+            <a:pPr lvl="1"/>
+            <a:r>
+              <a:rPr lang="en-IE" dirty="0" smtClean="0"/>
+              <a:t>&lt;</a:t>
+            </a:r>
+            <a:r>
+              <a:rPr lang="en-IE" dirty="0" err="1" smtClean="0"/>
+              <a:t>dropbox</a:t>
+            </a:r>
+            <a:r>
+              <a:rPr lang="en-IE" dirty="0" smtClean="0"/>
+              <a:t> reference&gt;</a:t>
+            </a:r>
+            <a:endParaRPr lang="en-IE" dirty="0" smtClean="0"/>
           </a:p>
         </p:txBody>
       </p:sp>
@@ -6380,86 +7381,119 @@
             <p:ph type="title"/>
           </p:nvPr>
         </p:nvSpPr>
-        <p:spPr/>
-        <p:txBody>
-          <a:bodyPr/>
-          <a:lstStyle/>
-          <a:p>
-            <a:r>
-              <a:rPr lang="en-IE" dirty="0" smtClean="0"/>
-              <a:t>Now Practice Some More!</a:t>
-            </a:r>
-            <a:endParaRPr lang="en-IE" dirty="0"/>
-          </a:p>
-        </p:txBody>
-      </p:sp>
-      <p:sp>
-        <p:nvSpPr>
-          <p:cNvPr id="3" name="Content Placeholder 2"/>
-          <p:cNvSpPr>
-            <a:spLocks noGrp="1"/>
-          </p:cNvSpPr>
-          <p:nvPr>
-            <p:ph idx="1"/>
-          </p:nvPr>
-        </p:nvSpPr>
-        <p:spPr/>
+        <p:spPr>
+          <a:xfrm>
+            <a:off x="1571625" y="155448"/>
+            <a:ext cx="7115175" cy="1252728"/>
+          </a:xfrm>
+        </p:spPr>
         <p:txBody>
           <a:bodyPr>
             <a:normAutofit/>
           </a:bodyPr>
           <a:lstStyle/>
           <a:p>
+            <a:r>
+              <a:rPr lang="en-IE" dirty="0" smtClean="0"/>
+              <a:t>Adding </a:t>
+            </a:r>
+            <a:r>
+              <a:rPr lang="en-IE" dirty="0" err="1" smtClean="0"/>
+              <a:t>Javascript</a:t>
+            </a:r>
+            <a:endParaRPr lang="en-IE" dirty="0"/>
+          </a:p>
+        </p:txBody>
+      </p:sp>
+      <p:sp>
+        <p:nvSpPr>
+          <p:cNvPr id="3" name="Content Placeholder 2"/>
+          <p:cNvSpPr>
+            <a:spLocks noGrp="1"/>
+          </p:cNvSpPr>
+          <p:nvPr>
+            <p:ph idx="1"/>
+          </p:nvPr>
+        </p:nvSpPr>
+        <p:spPr/>
+        <p:txBody>
+          <a:bodyPr>
+            <a:normAutofit/>
+          </a:bodyPr>
+          <a:lstStyle/>
+          <a:p>
+            <a:r>
+              <a:rPr lang="en-IE" dirty="0" smtClean="0"/>
+              <a:t>In the page &lt;head&gt;, we add in the </a:t>
+            </a:r>
+            <a:r>
+              <a:rPr lang="en-IE" dirty="0" err="1" smtClean="0"/>
+              <a:t>javascript</a:t>
+            </a:r>
+            <a:r>
+              <a:rPr lang="en-IE" dirty="0" smtClean="0"/>
+              <a:t> </a:t>
+            </a:r>
+            <a:r>
+              <a:rPr lang="en-IE" dirty="0"/>
+              <a:t>reference</a:t>
+            </a:r>
+            <a:r>
+              <a:rPr lang="en-IE" dirty="0" smtClean="0"/>
+              <a:t>:</a:t>
+            </a:r>
+          </a:p>
+          <a:p>
             <a:pPr marL="118872" indent="0">
               <a:buNone/>
             </a:pPr>
             <a:r>
+              <a:rPr lang="en-IE" dirty="0"/>
+              <a:t/>
+            </a:r>
+            <a:br>
+              <a:rPr lang="en-IE" dirty="0"/>
+            </a:br>
+            <a:r>
+              <a:rPr lang="en-IE" sz="2400" b="1" dirty="0"/>
+              <a:t>&lt;</a:t>
+            </a:r>
+            <a:r>
+              <a:rPr lang="en-IE" sz="2400" b="1" dirty="0" smtClean="0"/>
+              <a:t>script </a:t>
+            </a:r>
+            <a:r>
+              <a:rPr lang="en-IE" sz="2400" b="1" dirty="0"/>
+              <a:t>type="text/</a:t>
+            </a:r>
+            <a:r>
+              <a:rPr lang="en-IE" sz="2400" b="1" dirty="0" err="1"/>
+              <a:t>javascript</a:t>
+            </a:r>
+            <a:r>
+              <a:rPr lang="en-IE" sz="2400" b="1" dirty="0"/>
+              <a:t>" </a:t>
+            </a:r>
+            <a:r>
+              <a:rPr lang="en-IE" sz="2400" b="1" dirty="0" err="1"/>
+              <a:t>src</a:t>
+            </a:r>
+            <a:r>
+              <a:rPr lang="en-IE" sz="2400" b="1" dirty="0"/>
+              <a:t>="colours_b.js"&gt;&lt;/script</a:t>
+            </a:r>
+            <a:r>
+              <a:rPr lang="en-IE" sz="2400" b="1" dirty="0" smtClean="0"/>
+              <a:t>&gt;</a:t>
+            </a:r>
+          </a:p>
+          <a:p>
+            <a:endParaRPr lang="en-IE" dirty="0" smtClean="0"/>
+          </a:p>
+          <a:p>
+            <a:r>
               <a:rPr lang="en-IE" dirty="0" smtClean="0"/>
-              <a:t>At </a:t>
-            </a:r>
-            <a:r>
-              <a:rPr lang="en-IE" dirty="0"/>
-              <a:t>home, practice what you learned this week</a:t>
-            </a:r>
-          </a:p>
-          <a:p>
-            <a:pPr marL="118872" indent="0">
-              <a:buNone/>
-            </a:pPr>
-            <a:endParaRPr lang="en-IE" dirty="0" smtClean="0"/>
-          </a:p>
-          <a:p>
-            <a:pPr marL="118872" indent="0">
-              <a:buNone/>
-            </a:pPr>
-            <a:r>
-              <a:rPr lang="en-IE" dirty="0" smtClean="0"/>
-              <a:t>Upload your work to dojo.hallamor.org</a:t>
-            </a:r>
-          </a:p>
-          <a:p>
-            <a:pPr marL="118872" indent="0">
-              <a:buNone/>
-            </a:pPr>
-            <a:endParaRPr lang="en-IE" dirty="0"/>
-          </a:p>
-          <a:p>
-            <a:pPr marL="118872" indent="0">
-              <a:buNone/>
-            </a:pPr>
-            <a:r>
-              <a:rPr lang="en-IE" dirty="0" smtClean="0"/>
-              <a:t>Look at </a:t>
-            </a:r>
-            <a:r>
-              <a:rPr lang="en-IE" dirty="0" smtClean="0">
-                <a:hlinkClick r:id="rId3"/>
-              </a:rPr>
-              <a:t>www.w3schools.com</a:t>
-            </a:r>
-            <a:r>
-              <a:rPr lang="en-IE" dirty="0" smtClean="0"/>
-              <a:t> and online for more </a:t>
+              <a:t>Now let’s put in some </a:t>
             </a:r>
             <a:r>
               <a:rPr lang="en-IE" dirty="0" err="1" smtClean="0"/>
@@ -6467,46 +7501,24 @@
             </a:r>
             <a:r>
               <a:rPr lang="en-IE" dirty="0" smtClean="0"/>
-              <a:t> tutorials</a:t>
-            </a:r>
-          </a:p>
-          <a:p>
-            <a:pPr marL="118872" indent="0">
-              <a:buNone/>
-            </a:pPr>
-            <a:endParaRPr lang="en-IE" dirty="0"/>
-          </a:p>
-          <a:p>
-            <a:pPr marL="118872" indent="0">
-              <a:buNone/>
-            </a:pPr>
+              <a:t> into this .</a:t>
+            </a:r>
+            <a:r>
+              <a:rPr lang="en-IE" dirty="0" err="1" smtClean="0"/>
+              <a:t>js</a:t>
+            </a:r>
             <a:r>
               <a:rPr lang="en-IE" dirty="0" smtClean="0"/>
-              <a:t>Send us the URLs of your websites to look at, to </a:t>
-            </a:r>
-            <a:r>
-              <a:rPr lang="en-IE" dirty="0" smtClean="0">
-                <a:hlinkClick r:id="rId4"/>
-              </a:rPr>
-              <a:t>bray@coderdojo.com</a:t>
-            </a:r>
-            <a:r>
-              <a:rPr lang="en-IE" dirty="0" smtClean="0"/>
-              <a:t> </a:t>
-            </a:r>
-          </a:p>
-          <a:p>
-            <a:pPr marL="118872" indent="0">
-              <a:buNone/>
-            </a:pPr>
-            <a:endParaRPr lang="en-IE" sz="2800" dirty="0" smtClean="0"/>
+              <a:t> file</a:t>
+            </a:r>
+            <a:endParaRPr lang="en-IE" dirty="0" smtClean="0"/>
           </a:p>
         </p:txBody>
       </p:sp>
     </p:spTree>
     <p:extLst>
       <p:ext uri="{BB962C8B-B14F-4D97-AF65-F5344CB8AC3E}">
-        <p14:creationId xmlns:p14="http://schemas.microsoft.com/office/powerpoint/2010/main" val="2703784961"/>
+        <p14:creationId xmlns:p14="http://schemas.microsoft.com/office/powerpoint/2010/main" val="1066310025"/>
       </p:ext>
     </p:extLst>
   </p:cSld>

</xml_diff>